<commit_message>
Update Powerpoint Linking vital rates to climate drivers.pptx
</commit_message>
<xml_diff>
--- a/Powerpoint Linking vital rates to climate drivers.pptx
+++ b/Powerpoint Linking vital rates to climate drivers.pptx
@@ -11,11 +11,12 @@
     <p:sldId id="261" r:id="rId5"/>
     <p:sldId id="257" r:id="rId6"/>
     <p:sldId id="258" r:id="rId7"/>
-    <p:sldId id="262" r:id="rId8"/>
-    <p:sldId id="264" r:id="rId9"/>
-    <p:sldId id="263" r:id="rId10"/>
-    <p:sldId id="265" r:id="rId11"/>
-    <p:sldId id="266" r:id="rId12"/>
+    <p:sldId id="267" r:id="rId8"/>
+    <p:sldId id="262" r:id="rId9"/>
+    <p:sldId id="264" r:id="rId10"/>
+    <p:sldId id="263" r:id="rId11"/>
+    <p:sldId id="265" r:id="rId12"/>
+    <p:sldId id="266" r:id="rId13"/>
   </p:sldIdLst>
   <p:sldSz cx="12192000" cy="6858000"/>
   <p:notesSz cx="6858000" cy="9144000"/>
@@ -114,6 +115,11 @@
       </a:defRPr>
     </a:lvl9pPr>
   </p:defaultTextStyle>
+  <p:extLst>
+    <p:ext uri="{EFAFB233-063F-42B5-8137-9DF3F51BA10A}">
+      <p15:sldGuideLst xmlns:p15="http://schemas.microsoft.com/office/powerpoint/2012/main"/>
+    </p:ext>
+  </p:extLst>
 </p:presentation>
 </file>
 
@@ -266,7 +272,7 @@
           <a:p>
             <a:fld id="{B1B5FAB3-5424-4F1B-9D1C-EC118F17D2A5}" type="datetimeFigureOut">
               <a:rPr lang="en-GB" smtClean="0"/>
-              <a:t>10/11/2021</a:t>
+              <a:t>11/11/2021</a:t>
             </a:fld>
             <a:endParaRPr lang="en-GB"/>
           </a:p>
@@ -466,7 +472,7 @@
           <a:p>
             <a:fld id="{B1B5FAB3-5424-4F1B-9D1C-EC118F17D2A5}" type="datetimeFigureOut">
               <a:rPr lang="en-GB" smtClean="0"/>
-              <a:t>10/11/2021</a:t>
+              <a:t>11/11/2021</a:t>
             </a:fld>
             <a:endParaRPr lang="en-GB"/>
           </a:p>
@@ -676,7 +682,7 @@
           <a:p>
             <a:fld id="{B1B5FAB3-5424-4F1B-9D1C-EC118F17D2A5}" type="datetimeFigureOut">
               <a:rPr lang="en-GB" smtClean="0"/>
-              <a:t>10/11/2021</a:t>
+              <a:t>11/11/2021</a:t>
             </a:fld>
             <a:endParaRPr lang="en-GB"/>
           </a:p>
@@ -876,7 +882,7 @@
           <a:p>
             <a:fld id="{B1B5FAB3-5424-4F1B-9D1C-EC118F17D2A5}" type="datetimeFigureOut">
               <a:rPr lang="en-GB" smtClean="0"/>
-              <a:t>10/11/2021</a:t>
+              <a:t>11/11/2021</a:t>
             </a:fld>
             <a:endParaRPr lang="en-GB"/>
           </a:p>
@@ -1152,7 +1158,7 @@
           <a:p>
             <a:fld id="{B1B5FAB3-5424-4F1B-9D1C-EC118F17D2A5}" type="datetimeFigureOut">
               <a:rPr lang="en-GB" smtClean="0"/>
-              <a:t>10/11/2021</a:t>
+              <a:t>11/11/2021</a:t>
             </a:fld>
             <a:endParaRPr lang="en-GB"/>
           </a:p>
@@ -1420,7 +1426,7 @@
           <a:p>
             <a:fld id="{B1B5FAB3-5424-4F1B-9D1C-EC118F17D2A5}" type="datetimeFigureOut">
               <a:rPr lang="en-GB" smtClean="0"/>
-              <a:t>10/11/2021</a:t>
+              <a:t>11/11/2021</a:t>
             </a:fld>
             <a:endParaRPr lang="en-GB"/>
           </a:p>
@@ -1835,7 +1841,7 @@
           <a:p>
             <a:fld id="{B1B5FAB3-5424-4F1B-9D1C-EC118F17D2A5}" type="datetimeFigureOut">
               <a:rPr lang="en-GB" smtClean="0"/>
-              <a:t>10/11/2021</a:t>
+              <a:t>11/11/2021</a:t>
             </a:fld>
             <a:endParaRPr lang="en-GB"/>
           </a:p>
@@ -1977,7 +1983,7 @@
           <a:p>
             <a:fld id="{B1B5FAB3-5424-4F1B-9D1C-EC118F17D2A5}" type="datetimeFigureOut">
               <a:rPr lang="en-GB" smtClean="0"/>
-              <a:t>10/11/2021</a:t>
+              <a:t>11/11/2021</a:t>
             </a:fld>
             <a:endParaRPr lang="en-GB"/>
           </a:p>
@@ -2090,7 +2096,7 @@
           <a:p>
             <a:fld id="{B1B5FAB3-5424-4F1B-9D1C-EC118F17D2A5}" type="datetimeFigureOut">
               <a:rPr lang="en-GB" smtClean="0"/>
-              <a:t>10/11/2021</a:t>
+              <a:t>11/11/2021</a:t>
             </a:fld>
             <a:endParaRPr lang="en-GB"/>
           </a:p>
@@ -2403,7 +2409,7 @@
           <a:p>
             <a:fld id="{B1B5FAB3-5424-4F1B-9D1C-EC118F17D2A5}" type="datetimeFigureOut">
               <a:rPr lang="en-GB" smtClean="0"/>
-              <a:t>10/11/2021</a:t>
+              <a:t>11/11/2021</a:t>
             </a:fld>
             <a:endParaRPr lang="en-GB"/>
           </a:p>
@@ -2692,7 +2698,7 @@
           <a:p>
             <a:fld id="{B1B5FAB3-5424-4F1B-9D1C-EC118F17D2A5}" type="datetimeFigureOut">
               <a:rPr lang="en-GB" smtClean="0"/>
-              <a:t>10/11/2021</a:t>
+              <a:t>11/11/2021</a:t>
             </a:fld>
             <a:endParaRPr lang="en-GB"/>
           </a:p>
@@ -2935,7 +2941,7 @@
           <a:p>
             <a:fld id="{B1B5FAB3-5424-4F1B-9D1C-EC118F17D2A5}" type="datetimeFigureOut">
               <a:rPr lang="en-GB" smtClean="0"/>
-              <a:t>10/11/2021</a:t>
+              <a:t>11/11/2021</a:t>
             </a:fld>
             <a:endParaRPr lang="en-GB"/>
           </a:p>
@@ -3443,1493 +3449,6 @@
           <p:cNvPr id="2" name="Title 1">
             <a:extLst>
               <a:ext uri="{FF2B5EF4-FFF2-40B4-BE49-F238E27FC236}">
-                <a16:creationId xmlns:a16="http://schemas.microsoft.com/office/drawing/2014/main" id="{E6D74056-F9AE-41D3-8C35-DFCDCF859D77}"/>
-              </a:ext>
-            </a:extLst>
-          </p:cNvPr>
-          <p:cNvSpPr>
-            <a:spLocks noGrp="1"/>
-          </p:cNvSpPr>
-          <p:nvPr>
-            <p:ph type="title"/>
-          </p:nvPr>
-        </p:nvSpPr>
-        <p:spPr/>
-        <p:txBody>
-          <a:bodyPr/>
-          <a:lstStyle/>
-          <a:p>
-            <a:r>
-              <a:rPr lang="en-GB" dirty="0"/>
-              <a:t>Why not just throw in everything?</a:t>
-            </a:r>
-          </a:p>
-        </p:txBody>
-      </p:sp>
-      <p:sp>
-        <p:nvSpPr>
-          <p:cNvPr id="3" name="Content Placeholder 2">
-            <a:extLst>
-              <a:ext uri="{FF2B5EF4-FFF2-40B4-BE49-F238E27FC236}">
-                <a16:creationId xmlns:a16="http://schemas.microsoft.com/office/drawing/2014/main" id="{F41D2133-4CC7-4273-9BA5-FED36FFB0C22}"/>
-              </a:ext>
-            </a:extLst>
-          </p:cNvPr>
-          <p:cNvSpPr>
-            <a:spLocks noGrp="1"/>
-          </p:cNvSpPr>
-          <p:nvPr>
-            <p:ph sz="half" idx="1"/>
-          </p:nvPr>
-        </p:nvSpPr>
-        <p:spPr>
-          <a:xfrm>
-            <a:off x="838200" y="1825625"/>
-            <a:ext cx="10472606" cy="4351338"/>
-          </a:xfrm>
-        </p:spPr>
-        <p:txBody>
-          <a:bodyPr/>
-          <a:lstStyle/>
-          <a:p>
-            <a:r>
-              <a:rPr lang="en-GB" dirty="0"/>
-              <a:t>Overfitting vs. underfitting</a:t>
-            </a:r>
-          </a:p>
-          <a:p>
-            <a:r>
-              <a:rPr lang="en-GB" dirty="0"/>
-              <a:t>Within sample vs. outside sample</a:t>
-            </a:r>
-          </a:p>
-        </p:txBody>
-      </p:sp>
-      <p:pic>
-        <p:nvPicPr>
-          <p:cNvPr id="6" name="Content Placeholder 5">
-            <a:extLst>
-              <a:ext uri="{FF2B5EF4-FFF2-40B4-BE49-F238E27FC236}">
-                <a16:creationId xmlns:a16="http://schemas.microsoft.com/office/drawing/2014/main" id="{BDC83D89-07D0-4344-8865-458D23E490B0}"/>
-              </a:ext>
-            </a:extLst>
-          </p:cNvPr>
-          <p:cNvPicPr>
-            <a:picLocks noGrp="1" noChangeAspect="1"/>
-          </p:cNvPicPr>
-          <p:nvPr>
-            <p:ph sz="half" idx="2"/>
-          </p:nvPr>
-        </p:nvPicPr>
-        <p:blipFill>
-          <a:blip r:embed="rId2">
-            <a:extLst>
-              <a:ext uri="{28A0092B-C50C-407E-A947-70E740481C1C}">
-                <a14:useLocalDpi xmlns:a14="http://schemas.microsoft.com/office/drawing/2010/main" val="0"/>
-              </a:ext>
-            </a:extLst>
-          </a:blip>
-          <a:stretch>
-            <a:fillRect/>
-          </a:stretch>
-        </p:blipFill>
-        <p:spPr>
-          <a:xfrm>
-            <a:off x="728793" y="2876537"/>
-            <a:ext cx="10582013" cy="3677836"/>
-          </a:xfrm>
-        </p:spPr>
-      </p:pic>
-      <p:sp>
-        <p:nvSpPr>
-          <p:cNvPr id="7" name="TextBox 6">
-            <a:extLst>
-              <a:ext uri="{FF2B5EF4-FFF2-40B4-BE49-F238E27FC236}">
-                <a16:creationId xmlns:a16="http://schemas.microsoft.com/office/drawing/2014/main" id="{EBF46B33-6D33-4D95-A98B-B0FA7C91E39A}"/>
-              </a:ext>
-            </a:extLst>
-          </p:cNvPr>
-          <p:cNvSpPr txBox="1"/>
-          <p:nvPr/>
-        </p:nvSpPr>
-        <p:spPr>
-          <a:xfrm>
-            <a:off x="9068132" y="6488668"/>
-            <a:ext cx="3123868" cy="369332"/>
-          </a:xfrm>
-          <a:prstGeom prst="rect">
-            <a:avLst/>
-          </a:prstGeom>
-          <a:noFill/>
-        </p:spPr>
-        <p:txBody>
-          <a:bodyPr wrap="none" rtlCol="0">
-            <a:spAutoFit/>
-          </a:bodyPr>
-          <a:lstStyle/>
-          <a:p>
-            <a:r>
-              <a:rPr lang="en-GB" dirty="0"/>
-              <a:t>https://medium.com/greyatom</a:t>
-            </a:r>
-          </a:p>
-        </p:txBody>
-      </p:sp>
-    </p:spTree>
-    <p:extLst>
-      <p:ext uri="{BB962C8B-B14F-4D97-AF65-F5344CB8AC3E}">
-        <p14:creationId xmlns:p14="http://schemas.microsoft.com/office/powerpoint/2010/main" val="898158929"/>
-      </p:ext>
-    </p:extLst>
-  </p:cSld>
-  <p:clrMapOvr>
-    <a:masterClrMapping/>
-  </p:clrMapOvr>
-</p:sld>
-</file>
-
-<file path=ppt/slides/slide11.xml><?xml version="1.0" encoding="utf-8"?>
-<p:sld xmlns:a="http://schemas.openxmlformats.org/drawingml/2006/main" xmlns:r="http://schemas.openxmlformats.org/officeDocument/2006/relationships" xmlns:p="http://schemas.openxmlformats.org/presentationml/2006/main">
-  <p:cSld>
-    <p:spTree>
-      <p:nvGrpSpPr>
-        <p:cNvPr id="1" name=""/>
-        <p:cNvGrpSpPr/>
-        <p:nvPr/>
-      </p:nvGrpSpPr>
-      <p:grpSpPr>
-        <a:xfrm>
-          <a:off x="0" y="0"/>
-          <a:ext cx="0" cy="0"/>
-          <a:chOff x="0" y="0"/>
-          <a:chExt cx="0" cy="0"/>
-        </a:xfrm>
-      </p:grpSpPr>
-      <p:sp>
-        <p:nvSpPr>
-          <p:cNvPr id="2" name="Title 1">
-            <a:extLst>
-              <a:ext uri="{FF2B5EF4-FFF2-40B4-BE49-F238E27FC236}">
-                <a16:creationId xmlns:a16="http://schemas.microsoft.com/office/drawing/2014/main" id="{15A2D47B-6A5C-415E-A326-4099525BF967}"/>
-              </a:ext>
-            </a:extLst>
-          </p:cNvPr>
-          <p:cNvSpPr>
-            <a:spLocks noGrp="1"/>
-          </p:cNvSpPr>
-          <p:nvPr>
-            <p:ph type="title"/>
-          </p:nvPr>
-        </p:nvSpPr>
-        <p:spPr/>
-        <p:txBody>
-          <a:bodyPr/>
-          <a:lstStyle/>
-          <a:p>
-            <a:r>
-              <a:rPr lang="en-GB" dirty="0"/>
-              <a:t>Even if you do everything right</a:t>
-            </a:r>
-          </a:p>
-        </p:txBody>
-      </p:sp>
-      <p:sp>
-        <p:nvSpPr>
-          <p:cNvPr id="10" name="Content Placeholder 9">
-            <a:extLst>
-              <a:ext uri="{FF2B5EF4-FFF2-40B4-BE49-F238E27FC236}">
-                <a16:creationId xmlns:a16="http://schemas.microsoft.com/office/drawing/2014/main" id="{D6CF4DF3-94FF-401D-BA36-7BFB0AFE9540}"/>
-              </a:ext>
-            </a:extLst>
-          </p:cNvPr>
-          <p:cNvSpPr>
-            <a:spLocks noGrp="1"/>
-          </p:cNvSpPr>
-          <p:nvPr>
-            <p:ph idx="1"/>
-          </p:nvPr>
-        </p:nvSpPr>
-        <p:spPr/>
-        <p:txBody>
-          <a:bodyPr/>
-          <a:lstStyle/>
-          <a:p>
-            <a:r>
-              <a:rPr lang="en-GB" dirty="0"/>
-              <a:t>It’s not an exact science</a:t>
-            </a:r>
-          </a:p>
-          <a:p>
-            <a:endParaRPr lang="en-GB" dirty="0"/>
-          </a:p>
-          <a:p>
-            <a:r>
-              <a:rPr lang="en-GB" dirty="0"/>
-              <a:t>Uncertainties strengthen our research</a:t>
-            </a:r>
-          </a:p>
-        </p:txBody>
-      </p:sp>
-      <p:pic>
-        <p:nvPicPr>
-          <p:cNvPr id="11" name="Picture 10">
-            <a:extLst>
-              <a:ext uri="{FF2B5EF4-FFF2-40B4-BE49-F238E27FC236}">
-                <a16:creationId xmlns:a16="http://schemas.microsoft.com/office/drawing/2014/main" id="{4E672852-0698-42C3-AF54-D040601CDEE0}"/>
-              </a:ext>
-            </a:extLst>
-          </p:cNvPr>
-          <p:cNvPicPr>
-            <a:picLocks noChangeAspect="1"/>
-          </p:cNvPicPr>
-          <p:nvPr/>
-        </p:nvPicPr>
-        <p:blipFill rotWithShape="1">
-          <a:blip r:embed="rId2"/>
-          <a:srcRect b="52334"/>
-          <a:stretch/>
-        </p:blipFill>
-        <p:spPr>
-          <a:xfrm>
-            <a:off x="7920650" y="365125"/>
-            <a:ext cx="3433150" cy="5802592"/>
-          </a:xfrm>
-          <a:prstGeom prst="rect">
-            <a:avLst/>
-          </a:prstGeom>
-        </p:spPr>
-      </p:pic>
-      <p:sp>
-        <p:nvSpPr>
-          <p:cNvPr id="12" name="TextBox 11">
-            <a:extLst>
-              <a:ext uri="{FF2B5EF4-FFF2-40B4-BE49-F238E27FC236}">
-                <a16:creationId xmlns:a16="http://schemas.microsoft.com/office/drawing/2014/main" id="{1F8A2FB0-D602-42E0-9E4A-54FD39E315B9}"/>
-              </a:ext>
-            </a:extLst>
-          </p:cNvPr>
-          <p:cNvSpPr txBox="1"/>
-          <p:nvPr/>
-        </p:nvSpPr>
-        <p:spPr>
-          <a:xfrm>
-            <a:off x="9823829" y="6176963"/>
-            <a:ext cx="1529971" cy="369332"/>
-          </a:xfrm>
-          <a:prstGeom prst="rect">
-            <a:avLst/>
-          </a:prstGeom>
-          <a:noFill/>
-        </p:spPr>
-        <p:txBody>
-          <a:bodyPr wrap="none" rtlCol="0">
-            <a:spAutoFit/>
-          </a:bodyPr>
-          <a:lstStyle/>
-          <a:p>
-            <a:r>
-              <a:rPr lang="en-GB" dirty="0"/>
-              <a:t>Iler et al, 2019</a:t>
-            </a:r>
-          </a:p>
-        </p:txBody>
-      </p:sp>
-    </p:spTree>
-    <p:extLst>
-      <p:ext uri="{BB962C8B-B14F-4D97-AF65-F5344CB8AC3E}">
-        <p14:creationId xmlns:p14="http://schemas.microsoft.com/office/powerpoint/2010/main" val="1862097196"/>
-      </p:ext>
-    </p:extLst>
-  </p:cSld>
-  <p:clrMapOvr>
-    <a:masterClrMapping/>
-  </p:clrMapOvr>
-</p:sld>
-</file>
-
-<file path=ppt/slides/slide2.xml><?xml version="1.0" encoding="utf-8"?>
-<p:sld xmlns:a="http://schemas.openxmlformats.org/drawingml/2006/main" xmlns:r="http://schemas.openxmlformats.org/officeDocument/2006/relationships" xmlns:p="http://schemas.openxmlformats.org/presentationml/2006/main">
-  <p:cSld>
-    <p:spTree>
-      <p:nvGrpSpPr>
-        <p:cNvPr id="1" name=""/>
-        <p:cNvGrpSpPr/>
-        <p:nvPr/>
-      </p:nvGrpSpPr>
-      <p:grpSpPr>
-        <a:xfrm>
-          <a:off x="0" y="0"/>
-          <a:ext cx="0" cy="0"/>
-          <a:chOff x="0" y="0"/>
-          <a:chExt cx="0" cy="0"/>
-        </a:xfrm>
-      </p:grpSpPr>
-      <p:sp>
-        <p:nvSpPr>
-          <p:cNvPr id="2" name="Title 1">
-            <a:extLst>
-              <a:ext uri="{FF2B5EF4-FFF2-40B4-BE49-F238E27FC236}">
-                <a16:creationId xmlns:a16="http://schemas.microsoft.com/office/drawing/2014/main" id="{4CEFFDE4-0B7C-412B-968B-AFC9BE9A32D6}"/>
-              </a:ext>
-            </a:extLst>
-          </p:cNvPr>
-          <p:cNvSpPr>
-            <a:spLocks noGrp="1"/>
-          </p:cNvSpPr>
-          <p:nvPr>
-            <p:ph type="title"/>
-          </p:nvPr>
-        </p:nvSpPr>
-        <p:spPr/>
-        <p:txBody>
-          <a:bodyPr/>
-          <a:lstStyle/>
-          <a:p>
-            <a:r>
-              <a:rPr lang="en-GB" dirty="0"/>
-              <a:t>Linear regressions</a:t>
-            </a:r>
-            <a:br>
-              <a:rPr lang="en-GB" dirty="0"/>
-            </a:br>
-            <a:r>
-              <a:rPr lang="en-GB" dirty="0"/>
-              <a:t>(LM)</a:t>
-            </a:r>
-          </a:p>
-        </p:txBody>
-      </p:sp>
-      <p:sp>
-        <p:nvSpPr>
-          <p:cNvPr id="3" name="Content Placeholder 2">
-            <a:extLst>
-              <a:ext uri="{FF2B5EF4-FFF2-40B4-BE49-F238E27FC236}">
-                <a16:creationId xmlns:a16="http://schemas.microsoft.com/office/drawing/2014/main" id="{0C85B67F-2489-4490-AEE8-CB80F630C4FC}"/>
-              </a:ext>
-            </a:extLst>
-          </p:cNvPr>
-          <p:cNvSpPr>
-            <a:spLocks noGrp="1"/>
-          </p:cNvSpPr>
-          <p:nvPr>
-            <p:ph idx="1"/>
-          </p:nvPr>
-        </p:nvSpPr>
-        <p:spPr>
-          <a:xfrm>
-            <a:off x="838200" y="1825625"/>
-            <a:ext cx="4657078" cy="4351338"/>
-          </a:xfrm>
-        </p:spPr>
-        <p:txBody>
-          <a:bodyPr/>
-          <a:lstStyle/>
-          <a:p>
-            <a:r>
-              <a:rPr lang="en-GB" dirty="0"/>
-              <a:t>Assumes a linear relationship between x and y</a:t>
-            </a:r>
-          </a:p>
-          <a:p>
-            <a:endParaRPr lang="en-GB" dirty="0"/>
-          </a:p>
-          <a:p>
-            <a:endParaRPr lang="en-GB" dirty="0"/>
-          </a:p>
-          <a:p>
-            <a:r>
-              <a:rPr lang="en-GB" dirty="0"/>
-              <a:t>Variance in residuals (estimate errors) is assumed to be normal</a:t>
-            </a:r>
-          </a:p>
-        </p:txBody>
-      </p:sp>
-      <p:pic>
-        <p:nvPicPr>
-          <p:cNvPr id="5" name="Picture 4">
-            <a:extLst>
-              <a:ext uri="{FF2B5EF4-FFF2-40B4-BE49-F238E27FC236}">
-                <a16:creationId xmlns:a16="http://schemas.microsoft.com/office/drawing/2014/main" id="{BAEF08E2-FA5E-482C-8DE9-57E3B7B8F5CB}"/>
-              </a:ext>
-            </a:extLst>
-          </p:cNvPr>
-          <p:cNvPicPr>
-            <a:picLocks noChangeAspect="1"/>
-          </p:cNvPicPr>
-          <p:nvPr/>
-        </p:nvPicPr>
-        <p:blipFill>
-          <a:blip r:embed="rId2">
-            <a:extLst>
-              <a:ext uri="{28A0092B-C50C-407E-A947-70E740481C1C}">
-                <a14:useLocalDpi xmlns:a14="http://schemas.microsoft.com/office/drawing/2010/main" val="0"/>
-              </a:ext>
-            </a:extLst>
-          </a:blip>
-          <a:stretch>
-            <a:fillRect/>
-          </a:stretch>
-        </p:blipFill>
-        <p:spPr>
-          <a:xfrm>
-            <a:off x="5673570" y="1142983"/>
-            <a:ext cx="6400847" cy="4572033"/>
-          </a:xfrm>
-          <a:prstGeom prst="rect">
-            <a:avLst/>
-          </a:prstGeom>
-        </p:spPr>
-      </p:pic>
-      <mc:AlternateContent xmlns:mc="http://schemas.openxmlformats.org/markup-compatibility/2006">
-        <mc:Choice xmlns:a14="http://schemas.microsoft.com/office/drawing/2010/main" Requires="a14">
-          <p:sp>
-            <p:nvSpPr>
-              <p:cNvPr id="6" name="TextBox 5">
-                <a:extLst>
-                  <a:ext uri="{FF2B5EF4-FFF2-40B4-BE49-F238E27FC236}">
-                    <a16:creationId xmlns:a16="http://schemas.microsoft.com/office/drawing/2014/main" id="{1A5C3295-DA4D-455B-93D4-64BCF526D519}"/>
-                  </a:ext>
-                </a:extLst>
-              </p:cNvPr>
-              <p:cNvSpPr txBox="1"/>
-              <p:nvPr/>
-            </p:nvSpPr>
-            <p:spPr>
-              <a:xfrm>
-                <a:off x="1968975" y="2900528"/>
-                <a:ext cx="2395528" cy="461665"/>
-              </a:xfrm>
-              <a:prstGeom prst="rect">
-                <a:avLst/>
-              </a:prstGeom>
-              <a:noFill/>
-            </p:spPr>
-            <p:txBody>
-              <a:bodyPr wrap="none" rtlCol="0">
-                <a:spAutoFit/>
-              </a:bodyPr>
-              <a:lstStyle/>
-              <a:p>
-                <a14:m>
-                  <m:oMath xmlns:m="http://schemas.openxmlformats.org/officeDocument/2006/math">
-                    <m:r>
-                      <a:rPr lang="en-US" sz="2400" b="0" i="1" smtClean="0">
-                        <a:latin typeface="Cambria Math" panose="02040503050406030204" pitchFamily="18" charset="0"/>
-                      </a:rPr>
-                      <m:t>𝑌</m:t>
-                    </m:r>
-                    <m:r>
-                      <a:rPr lang="en-US" sz="2400" b="0" i="1" smtClean="0">
-                        <a:latin typeface="Cambria Math" panose="02040503050406030204" pitchFamily="18" charset="0"/>
-                      </a:rPr>
-                      <m:t>=</m:t>
-                    </m:r>
-                    <m:sSub>
-                      <m:sSubPr>
-                        <m:ctrlPr>
-                          <a:rPr lang="en-US" sz="2400" b="0" i="1" smtClean="0">
-                            <a:latin typeface="Cambria Math" panose="02040503050406030204" pitchFamily="18" charset="0"/>
-                          </a:rPr>
-                        </m:ctrlPr>
-                      </m:sSubPr>
-                      <m:e>
-                        <m:r>
-                          <m:rPr>
-                            <m:sty m:val="p"/>
-                          </m:rPr>
-                          <a:rPr lang="el-GR" sz="2400" b="0" i="1" smtClean="0">
-                            <a:latin typeface="Cambria Math" panose="02040503050406030204" pitchFamily="18" charset="0"/>
-                          </a:rPr>
-                          <m:t>β</m:t>
-                        </m:r>
-                      </m:e>
-                      <m:sub>
-                        <m:r>
-                          <a:rPr lang="en-US" sz="2400" b="0" i="1" smtClean="0">
-                            <a:latin typeface="Cambria Math" panose="02040503050406030204" pitchFamily="18" charset="0"/>
-                          </a:rPr>
-                          <m:t>0</m:t>
-                        </m:r>
-                      </m:sub>
-                    </m:sSub>
-                    <m:r>
-                      <a:rPr lang="en-US" sz="2400" b="0" i="1" smtClean="0">
-                        <a:latin typeface="Cambria Math" panose="02040503050406030204" pitchFamily="18" charset="0"/>
-                      </a:rPr>
-                      <m:t>+</m:t>
-                    </m:r>
-                    <m:r>
-                      <a:rPr lang="en-US" sz="2400" b="0" i="1" smtClean="0">
-                        <a:latin typeface="Cambria Math" panose="02040503050406030204" pitchFamily="18" charset="0"/>
-                      </a:rPr>
-                      <m:t>𝑋</m:t>
-                    </m:r>
-                    <m:sSub>
-                      <m:sSubPr>
-                        <m:ctrlPr>
-                          <a:rPr lang="en-US" sz="2400" b="0" i="1" smtClean="0">
-                            <a:latin typeface="Cambria Math" panose="02040503050406030204" pitchFamily="18" charset="0"/>
-                          </a:rPr>
-                        </m:ctrlPr>
-                      </m:sSubPr>
-                      <m:e>
-                        <m:r>
-                          <a:rPr lang="en-US" sz="2400" b="0" i="1" smtClean="0">
-                            <a:latin typeface="Cambria Math" panose="02040503050406030204" pitchFamily="18" charset="0"/>
-                          </a:rPr>
-                          <m:t>∗</m:t>
-                        </m:r>
-                        <m:r>
-                          <m:rPr>
-                            <m:sty m:val="p"/>
-                          </m:rPr>
-                          <a:rPr lang="el-GR" sz="2400" b="0" i="1" smtClean="0">
-                            <a:latin typeface="Cambria Math" panose="02040503050406030204" pitchFamily="18" charset="0"/>
-                          </a:rPr>
-                          <m:t>β</m:t>
-                        </m:r>
-                      </m:e>
-                      <m:sub>
-                        <m:r>
-                          <a:rPr lang="en-US" sz="2400" b="0" i="1" smtClean="0">
-                            <a:latin typeface="Cambria Math" panose="02040503050406030204" pitchFamily="18" charset="0"/>
-                          </a:rPr>
-                          <m:t>1</m:t>
-                        </m:r>
-                      </m:sub>
-                    </m:sSub>
-                  </m:oMath>
-                </a14:m>
-                <a:r>
-                  <a:rPr lang="en-GB" sz="2400" dirty="0"/>
-                  <a:t>  </a:t>
-                </a:r>
-              </a:p>
-            </p:txBody>
-          </p:sp>
-        </mc:Choice>
-        <mc:Fallback>
-          <p:sp>
-            <p:nvSpPr>
-              <p:cNvPr id="6" name="TextBox 5">
-                <a:extLst>
-                  <a:ext uri="{FF2B5EF4-FFF2-40B4-BE49-F238E27FC236}">
-                    <a16:creationId xmlns:a16="http://schemas.microsoft.com/office/drawing/2014/main" id="{1A5C3295-DA4D-455B-93D4-64BCF526D519}"/>
-                  </a:ext>
-                </a:extLst>
-              </p:cNvPr>
-              <p:cNvSpPr txBox="1">
-                <a:spLocks noRot="1" noChangeAspect="1" noMove="1" noResize="1" noEditPoints="1" noAdjustHandles="1" noChangeArrowheads="1" noChangeShapeType="1" noTextEdit="1"/>
-              </p:cNvSpPr>
-              <p:nvPr/>
-            </p:nvSpPr>
-            <p:spPr>
-              <a:xfrm>
-                <a:off x="1968975" y="2900528"/>
-                <a:ext cx="2395528" cy="461665"/>
-              </a:xfrm>
-              <a:prstGeom prst="rect">
-                <a:avLst/>
-              </a:prstGeom>
-              <a:blipFill>
-                <a:blip r:embed="rId3"/>
-                <a:stretch>
-                  <a:fillRect l="-763" b="-17105"/>
-                </a:stretch>
-              </a:blipFill>
-            </p:spPr>
-            <p:txBody>
-              <a:bodyPr/>
-              <a:lstStyle/>
-              <a:p>
-                <a:r>
-                  <a:rPr lang="en-GB">
-                    <a:noFill/>
-                  </a:rPr>
-                  <a:t> </a:t>
-                </a:r>
-              </a:p>
-            </p:txBody>
-          </p:sp>
-        </mc:Fallback>
-      </mc:AlternateContent>
-      <p:sp>
-        <p:nvSpPr>
-          <p:cNvPr id="7" name="TextBox 6">
-            <a:extLst>
-              <a:ext uri="{FF2B5EF4-FFF2-40B4-BE49-F238E27FC236}">
-                <a16:creationId xmlns:a16="http://schemas.microsoft.com/office/drawing/2014/main" id="{876AD966-F990-4F69-BBF2-1CB726A09842}"/>
-              </a:ext>
-            </a:extLst>
-          </p:cNvPr>
-          <p:cNvSpPr txBox="1"/>
-          <p:nvPr/>
-        </p:nvSpPr>
-        <p:spPr>
-          <a:xfrm>
-            <a:off x="6590402" y="6488668"/>
-            <a:ext cx="5601598" cy="369332"/>
-          </a:xfrm>
-          <a:prstGeom prst="rect">
-            <a:avLst/>
-          </a:prstGeom>
-          <a:noFill/>
-        </p:spPr>
-        <p:txBody>
-          <a:bodyPr wrap="none" rtlCol="0">
-            <a:spAutoFit/>
-          </a:bodyPr>
-          <a:lstStyle/>
-          <a:p>
-            <a:r>
-              <a:rPr lang="en-GB" dirty="0"/>
-              <a:t>https://bookdown.org/ekothe/navarro26/regression.html</a:t>
-            </a:r>
-          </a:p>
-        </p:txBody>
-      </p:sp>
-    </p:spTree>
-    <p:extLst>
-      <p:ext uri="{BB962C8B-B14F-4D97-AF65-F5344CB8AC3E}">
-        <p14:creationId xmlns:p14="http://schemas.microsoft.com/office/powerpoint/2010/main" val="3686086653"/>
-      </p:ext>
-    </p:extLst>
-  </p:cSld>
-  <p:clrMapOvr>
-    <a:masterClrMapping/>
-  </p:clrMapOvr>
-</p:sld>
-</file>
-
-<file path=ppt/slides/slide3.xml><?xml version="1.0" encoding="utf-8"?>
-<p:sld xmlns:a="http://schemas.openxmlformats.org/drawingml/2006/main" xmlns:r="http://schemas.openxmlformats.org/officeDocument/2006/relationships" xmlns:p="http://schemas.openxmlformats.org/presentationml/2006/main">
-  <p:cSld>
-    <p:spTree>
-      <p:nvGrpSpPr>
-        <p:cNvPr id="1" name=""/>
-        <p:cNvGrpSpPr/>
-        <p:nvPr/>
-      </p:nvGrpSpPr>
-      <p:grpSpPr>
-        <a:xfrm>
-          <a:off x="0" y="0"/>
-          <a:ext cx="0" cy="0"/>
-          <a:chOff x="0" y="0"/>
-          <a:chExt cx="0" cy="0"/>
-        </a:xfrm>
-      </p:grpSpPr>
-      <p:sp>
-        <p:nvSpPr>
-          <p:cNvPr id="2" name="Title 1">
-            <a:extLst>
-              <a:ext uri="{FF2B5EF4-FFF2-40B4-BE49-F238E27FC236}">
-                <a16:creationId xmlns:a16="http://schemas.microsoft.com/office/drawing/2014/main" id="{F20B95BF-CDDB-49FD-8287-4A97F34DF7E9}"/>
-              </a:ext>
-            </a:extLst>
-          </p:cNvPr>
-          <p:cNvSpPr>
-            <a:spLocks noGrp="1"/>
-          </p:cNvSpPr>
-          <p:nvPr>
-            <p:ph type="title"/>
-          </p:nvPr>
-        </p:nvSpPr>
-        <p:spPr/>
-        <p:txBody>
-          <a:bodyPr/>
-          <a:lstStyle/>
-          <a:p>
-            <a:r>
-              <a:rPr lang="en-GB" dirty="0"/>
-              <a:t>Generalized linear regressions</a:t>
-            </a:r>
-            <a:br>
-              <a:rPr lang="en-GB" dirty="0"/>
-            </a:br>
-            <a:r>
-              <a:rPr lang="en-GB" dirty="0"/>
-              <a:t>(GLM)</a:t>
-            </a:r>
-          </a:p>
-        </p:txBody>
-      </p:sp>
-      <p:sp>
-        <p:nvSpPr>
-          <p:cNvPr id="3" name="Content Placeholder 2">
-            <a:extLst>
-              <a:ext uri="{FF2B5EF4-FFF2-40B4-BE49-F238E27FC236}">
-                <a16:creationId xmlns:a16="http://schemas.microsoft.com/office/drawing/2014/main" id="{7F7FDAB5-FCE6-4FE4-B9BB-B06D29ED82FB}"/>
-              </a:ext>
-            </a:extLst>
-          </p:cNvPr>
-          <p:cNvSpPr>
-            <a:spLocks noGrp="1"/>
-          </p:cNvSpPr>
-          <p:nvPr>
-            <p:ph idx="1"/>
-          </p:nvPr>
-        </p:nvSpPr>
-        <p:spPr>
-          <a:xfrm>
-            <a:off x="838200" y="1825625"/>
-            <a:ext cx="4222072" cy="4351338"/>
-          </a:xfrm>
-        </p:spPr>
-        <p:txBody>
-          <a:bodyPr/>
-          <a:lstStyle/>
-          <a:p>
-            <a:r>
-              <a:rPr lang="en-GB" dirty="0"/>
-              <a:t>Relationship between x and y does not have to be linear:</a:t>
-            </a:r>
-          </a:p>
-          <a:p>
-            <a:endParaRPr lang="en-GB" dirty="0"/>
-          </a:p>
-          <a:p>
-            <a:r>
-              <a:rPr lang="en-GB" dirty="0"/>
-              <a:t>Binomial (Bernoulli)</a:t>
-            </a:r>
-          </a:p>
-          <a:p>
-            <a:r>
-              <a:rPr lang="en-GB" dirty="0"/>
-              <a:t>Poisson</a:t>
-            </a:r>
-          </a:p>
-          <a:p>
-            <a:r>
-              <a:rPr lang="en-GB" dirty="0"/>
-              <a:t>Gamma</a:t>
-            </a:r>
-          </a:p>
-          <a:p>
-            <a:r>
-              <a:rPr lang="en-GB" dirty="0"/>
-              <a:t>Exponential</a:t>
-            </a:r>
-          </a:p>
-          <a:p>
-            <a:r>
-              <a:rPr lang="en-GB" dirty="0"/>
-              <a:t>And many more</a:t>
-            </a:r>
-          </a:p>
-        </p:txBody>
-      </p:sp>
-      <p:pic>
-        <p:nvPicPr>
-          <p:cNvPr id="5" name="Picture 4">
-            <a:extLst>
-              <a:ext uri="{FF2B5EF4-FFF2-40B4-BE49-F238E27FC236}">
-                <a16:creationId xmlns:a16="http://schemas.microsoft.com/office/drawing/2014/main" id="{CB2D1FCA-2563-4697-84B6-2E5B579D69BF}"/>
-              </a:ext>
-            </a:extLst>
-          </p:cNvPr>
-          <p:cNvPicPr>
-            <a:picLocks noChangeAspect="1"/>
-          </p:cNvPicPr>
-          <p:nvPr/>
-        </p:nvPicPr>
-        <p:blipFill>
-          <a:blip r:embed="rId2">
-            <a:extLst>
-              <a:ext uri="{28A0092B-C50C-407E-A947-70E740481C1C}">
-                <a14:useLocalDpi xmlns:a14="http://schemas.microsoft.com/office/drawing/2010/main" val="0"/>
-              </a:ext>
-            </a:extLst>
-          </a:blip>
-          <a:stretch>
-            <a:fillRect/>
-          </a:stretch>
-        </p:blipFill>
-        <p:spPr>
-          <a:xfrm>
-            <a:off x="5601810" y="1373484"/>
-            <a:ext cx="6293528" cy="5053459"/>
-          </a:xfrm>
-          <a:prstGeom prst="rect">
-            <a:avLst/>
-          </a:prstGeom>
-        </p:spPr>
-      </p:pic>
-      <p:sp>
-        <p:nvSpPr>
-          <p:cNvPr id="6" name="TextBox 5">
-            <a:extLst>
-              <a:ext uri="{FF2B5EF4-FFF2-40B4-BE49-F238E27FC236}">
-                <a16:creationId xmlns:a16="http://schemas.microsoft.com/office/drawing/2014/main" id="{AFDF5327-D5AE-479B-9B34-A5B2EC840E66}"/>
-              </a:ext>
-            </a:extLst>
-          </p:cNvPr>
-          <p:cNvSpPr txBox="1"/>
-          <p:nvPr/>
-        </p:nvSpPr>
-        <p:spPr>
-          <a:xfrm>
-            <a:off x="8048815" y="6492875"/>
-            <a:ext cx="4143185" cy="369332"/>
-          </a:xfrm>
-          <a:prstGeom prst="rect">
-            <a:avLst/>
-          </a:prstGeom>
-          <a:noFill/>
-        </p:spPr>
-        <p:txBody>
-          <a:bodyPr wrap="none" rtlCol="0">
-            <a:spAutoFit/>
-          </a:bodyPr>
-          <a:lstStyle/>
-          <a:p>
-            <a:r>
-              <a:rPr lang="en-GB" dirty="0"/>
-              <a:t>https://zhuanlan.zhihu.com/p/361449814</a:t>
-            </a:r>
-          </a:p>
-        </p:txBody>
-      </p:sp>
-    </p:spTree>
-    <p:extLst>
-      <p:ext uri="{BB962C8B-B14F-4D97-AF65-F5344CB8AC3E}">
-        <p14:creationId xmlns:p14="http://schemas.microsoft.com/office/powerpoint/2010/main" val="2633364411"/>
-      </p:ext>
-    </p:extLst>
-  </p:cSld>
-  <p:clrMapOvr>
-    <a:masterClrMapping/>
-  </p:clrMapOvr>
-</p:sld>
-</file>
-
-<file path=ppt/slides/slide4.xml><?xml version="1.0" encoding="utf-8"?>
-<p:sld xmlns:a="http://schemas.openxmlformats.org/drawingml/2006/main" xmlns:r="http://schemas.openxmlformats.org/officeDocument/2006/relationships" xmlns:p="http://schemas.openxmlformats.org/presentationml/2006/main">
-  <p:cSld>
-    <p:spTree>
-      <p:nvGrpSpPr>
-        <p:cNvPr id="1" name=""/>
-        <p:cNvGrpSpPr/>
-        <p:nvPr/>
-      </p:nvGrpSpPr>
-      <p:grpSpPr>
-        <a:xfrm>
-          <a:off x="0" y="0"/>
-          <a:ext cx="0" cy="0"/>
-          <a:chOff x="0" y="0"/>
-          <a:chExt cx="0" cy="0"/>
-        </a:xfrm>
-      </p:grpSpPr>
-      <p:sp>
-        <p:nvSpPr>
-          <p:cNvPr id="2" name="Title 1">
-            <a:extLst>
-              <a:ext uri="{FF2B5EF4-FFF2-40B4-BE49-F238E27FC236}">
-                <a16:creationId xmlns:a16="http://schemas.microsoft.com/office/drawing/2014/main" id="{F9B15984-8BC1-435A-8AC3-C1CFD3706EB4}"/>
-              </a:ext>
-            </a:extLst>
-          </p:cNvPr>
-          <p:cNvSpPr>
-            <a:spLocks noGrp="1"/>
-          </p:cNvSpPr>
-          <p:nvPr>
-            <p:ph type="ctrTitle"/>
-          </p:nvPr>
-        </p:nvSpPr>
-        <p:spPr>
-          <a:xfrm>
-            <a:off x="1524000" y="2235200"/>
-            <a:ext cx="9144000" cy="2387600"/>
-          </a:xfrm>
-        </p:spPr>
-        <p:txBody>
-          <a:bodyPr anchor="ctr"/>
-          <a:lstStyle/>
-          <a:p>
-            <a:r>
-              <a:rPr lang="en-GB" dirty="0"/>
-              <a:t>When are LM and GLM the same?</a:t>
-            </a:r>
-          </a:p>
-        </p:txBody>
-      </p:sp>
-    </p:spTree>
-    <p:extLst>
-      <p:ext uri="{BB962C8B-B14F-4D97-AF65-F5344CB8AC3E}">
-        <p14:creationId xmlns:p14="http://schemas.microsoft.com/office/powerpoint/2010/main" val="2264685100"/>
-      </p:ext>
-    </p:extLst>
-  </p:cSld>
-  <p:clrMapOvr>
-    <a:masterClrMapping/>
-  </p:clrMapOvr>
-</p:sld>
-</file>
-
-<file path=ppt/slides/slide5.xml><?xml version="1.0" encoding="utf-8"?>
-<p:sld xmlns:a="http://schemas.openxmlformats.org/drawingml/2006/main" xmlns:r="http://schemas.openxmlformats.org/officeDocument/2006/relationships" xmlns:p="http://schemas.openxmlformats.org/presentationml/2006/main">
-  <p:cSld>
-    <p:spTree>
-      <p:nvGrpSpPr>
-        <p:cNvPr id="1" name=""/>
-        <p:cNvGrpSpPr/>
-        <p:nvPr/>
-      </p:nvGrpSpPr>
-      <p:grpSpPr>
-        <a:xfrm>
-          <a:off x="0" y="0"/>
-          <a:ext cx="0" cy="0"/>
-          <a:chOff x="0" y="0"/>
-          <a:chExt cx="0" cy="0"/>
-        </a:xfrm>
-      </p:grpSpPr>
-      <p:sp>
-        <p:nvSpPr>
-          <p:cNvPr id="4" name="Title 3">
-            <a:extLst>
-              <a:ext uri="{FF2B5EF4-FFF2-40B4-BE49-F238E27FC236}">
-                <a16:creationId xmlns:a16="http://schemas.microsoft.com/office/drawing/2014/main" id="{EE9A9FE2-05A3-475D-A033-5ABFE9BC1573}"/>
-              </a:ext>
-            </a:extLst>
-          </p:cNvPr>
-          <p:cNvSpPr>
-            <a:spLocks noGrp="1"/>
-          </p:cNvSpPr>
-          <p:nvPr>
-            <p:ph type="title"/>
-          </p:nvPr>
-        </p:nvSpPr>
-        <p:spPr/>
-        <p:txBody>
-          <a:bodyPr/>
-          <a:lstStyle/>
-          <a:p>
-            <a:pPr algn="ctr"/>
-            <a:r>
-              <a:rPr lang="en-GB" dirty="0"/>
-              <a:t>Fixed effects vs. Random effects</a:t>
-            </a:r>
-          </a:p>
-        </p:txBody>
-      </p:sp>
-      <p:sp>
-        <p:nvSpPr>
-          <p:cNvPr id="5" name="Text Placeholder 4">
-            <a:extLst>
-              <a:ext uri="{FF2B5EF4-FFF2-40B4-BE49-F238E27FC236}">
-                <a16:creationId xmlns:a16="http://schemas.microsoft.com/office/drawing/2014/main" id="{BCD78042-27B3-4DF7-94EC-F8EB66DEFFA0}"/>
-              </a:ext>
-            </a:extLst>
-          </p:cNvPr>
-          <p:cNvSpPr>
-            <a:spLocks noGrp="1"/>
-          </p:cNvSpPr>
-          <p:nvPr>
-            <p:ph type="body" idx="1"/>
-          </p:nvPr>
-        </p:nvSpPr>
-        <p:spPr/>
-        <p:txBody>
-          <a:bodyPr/>
-          <a:lstStyle/>
-          <a:p>
-            <a:r>
-              <a:rPr lang="en-GB" dirty="0"/>
-              <a:t>Fixed effects</a:t>
-            </a:r>
-          </a:p>
-        </p:txBody>
-      </p:sp>
-      <p:sp>
-        <p:nvSpPr>
-          <p:cNvPr id="6" name="Content Placeholder 5">
-            <a:extLst>
-              <a:ext uri="{FF2B5EF4-FFF2-40B4-BE49-F238E27FC236}">
-                <a16:creationId xmlns:a16="http://schemas.microsoft.com/office/drawing/2014/main" id="{B5A82069-AC9F-485F-A042-239136D36DCB}"/>
-              </a:ext>
-            </a:extLst>
-          </p:cNvPr>
-          <p:cNvSpPr>
-            <a:spLocks noGrp="1"/>
-          </p:cNvSpPr>
-          <p:nvPr>
-            <p:ph sz="half" idx="2"/>
-          </p:nvPr>
-        </p:nvSpPr>
-        <p:spPr/>
-        <p:txBody>
-          <a:bodyPr>
-            <a:normAutofit lnSpcReduction="10000"/>
-          </a:bodyPr>
-          <a:lstStyle/>
-          <a:p>
-            <a:r>
-              <a:rPr lang="en-GB" dirty="0"/>
-              <a:t>Change they cause to individual is constant:</a:t>
-            </a:r>
-          </a:p>
-          <a:p>
-            <a:pPr marL="0" indent="0">
-              <a:buNone/>
-            </a:pPr>
-            <a:r>
-              <a:rPr lang="en-GB" dirty="0"/>
-              <a:t>Population – Treatment</a:t>
-            </a:r>
-          </a:p>
-          <a:p>
-            <a:pPr marL="0" indent="0">
-              <a:buNone/>
-            </a:pPr>
-            <a:endParaRPr lang="en-GB" dirty="0"/>
-          </a:p>
-          <a:p>
-            <a:r>
-              <a:rPr lang="en-GB" dirty="0"/>
-              <a:t>Variable of interest for researcher</a:t>
-            </a:r>
-          </a:p>
-          <a:p>
-            <a:endParaRPr lang="en-GB" dirty="0"/>
-          </a:p>
-          <a:p>
-            <a:r>
-              <a:rPr lang="en-GB" dirty="0"/>
-              <a:t>Estimated with full memory loss</a:t>
-            </a:r>
-          </a:p>
-        </p:txBody>
-      </p:sp>
-      <p:sp>
-        <p:nvSpPr>
-          <p:cNvPr id="7" name="Text Placeholder 6">
-            <a:extLst>
-              <a:ext uri="{FF2B5EF4-FFF2-40B4-BE49-F238E27FC236}">
-                <a16:creationId xmlns:a16="http://schemas.microsoft.com/office/drawing/2014/main" id="{E4B10CAE-D255-46C0-9591-77E0B5A2D544}"/>
-              </a:ext>
-            </a:extLst>
-          </p:cNvPr>
-          <p:cNvSpPr>
-            <a:spLocks noGrp="1"/>
-          </p:cNvSpPr>
-          <p:nvPr>
-            <p:ph type="body" sz="quarter" idx="3"/>
-          </p:nvPr>
-        </p:nvSpPr>
-        <p:spPr/>
-        <p:txBody>
-          <a:bodyPr/>
-          <a:lstStyle/>
-          <a:p>
-            <a:r>
-              <a:rPr lang="en-GB" dirty="0"/>
-              <a:t>Random effects</a:t>
-            </a:r>
-          </a:p>
-        </p:txBody>
-      </p:sp>
-      <p:sp>
-        <p:nvSpPr>
-          <p:cNvPr id="8" name="Content Placeholder 7">
-            <a:extLst>
-              <a:ext uri="{FF2B5EF4-FFF2-40B4-BE49-F238E27FC236}">
-                <a16:creationId xmlns:a16="http://schemas.microsoft.com/office/drawing/2014/main" id="{76AFAC07-D536-49B2-A663-E8D42A9751E7}"/>
-              </a:ext>
-            </a:extLst>
-          </p:cNvPr>
-          <p:cNvSpPr>
-            <a:spLocks noGrp="1"/>
-          </p:cNvSpPr>
-          <p:nvPr>
-            <p:ph sz="quarter" idx="4"/>
-          </p:nvPr>
-        </p:nvSpPr>
-        <p:spPr/>
-        <p:txBody>
-          <a:bodyPr>
-            <a:normAutofit lnSpcReduction="10000"/>
-          </a:bodyPr>
-          <a:lstStyle/>
-          <a:p>
-            <a:r>
-              <a:rPr lang="en-GB" dirty="0"/>
-              <a:t>Varies across individual</a:t>
-            </a:r>
-            <a:br>
-              <a:rPr lang="en-GB" dirty="0"/>
-            </a:br>
-            <a:endParaRPr lang="en-GB" dirty="0"/>
-          </a:p>
-          <a:p>
-            <a:pPr marL="0" indent="0">
-              <a:buNone/>
-            </a:pPr>
-            <a:r>
-              <a:rPr lang="en-GB" dirty="0"/>
-              <a:t>Year - individual</a:t>
-            </a:r>
-          </a:p>
-          <a:p>
-            <a:pPr marL="0" indent="0">
-              <a:buNone/>
-            </a:pPr>
-            <a:endParaRPr lang="en-GB" dirty="0"/>
-          </a:p>
-          <a:p>
-            <a:r>
-              <a:rPr lang="en-GB" dirty="0"/>
-              <a:t>“Other” variable interesting for the population </a:t>
-            </a:r>
-          </a:p>
-          <a:p>
-            <a:endParaRPr lang="en-GB" dirty="0"/>
-          </a:p>
-          <a:p>
-            <a:r>
-              <a:rPr lang="en-GB" dirty="0"/>
-              <a:t>Estimated with partial pooling</a:t>
-            </a:r>
-          </a:p>
-          <a:p>
-            <a:pPr marL="0" indent="0">
-              <a:buNone/>
-            </a:pPr>
-            <a:endParaRPr lang="en-GB" dirty="0"/>
-          </a:p>
-        </p:txBody>
-      </p:sp>
-    </p:spTree>
-    <p:extLst>
-      <p:ext uri="{BB962C8B-B14F-4D97-AF65-F5344CB8AC3E}">
-        <p14:creationId xmlns:p14="http://schemas.microsoft.com/office/powerpoint/2010/main" val="377524852"/>
-      </p:ext>
-    </p:extLst>
-  </p:cSld>
-  <p:clrMapOvr>
-    <a:masterClrMapping/>
-  </p:clrMapOvr>
-</p:sld>
-</file>
-
-<file path=ppt/slides/slide6.xml><?xml version="1.0" encoding="utf-8"?>
-<p:sld xmlns:a="http://schemas.openxmlformats.org/drawingml/2006/main" xmlns:r="http://schemas.openxmlformats.org/officeDocument/2006/relationships" xmlns:p="http://schemas.openxmlformats.org/presentationml/2006/main">
-  <p:cSld>
-    <p:spTree>
-      <p:nvGrpSpPr>
-        <p:cNvPr id="1" name=""/>
-        <p:cNvGrpSpPr/>
-        <p:nvPr/>
-      </p:nvGrpSpPr>
-      <p:grpSpPr>
-        <a:xfrm>
-          <a:off x="0" y="0"/>
-          <a:ext cx="0" cy="0"/>
-          <a:chOff x="0" y="0"/>
-          <a:chExt cx="0" cy="0"/>
-        </a:xfrm>
-      </p:grpSpPr>
-      <p:pic>
-        <p:nvPicPr>
-          <p:cNvPr id="10" name="Content Placeholder 9">
-            <a:extLst>
-              <a:ext uri="{FF2B5EF4-FFF2-40B4-BE49-F238E27FC236}">
-                <a16:creationId xmlns:a16="http://schemas.microsoft.com/office/drawing/2014/main" id="{D4D6EC67-655E-424E-BABD-036A24A1697A}"/>
-              </a:ext>
-            </a:extLst>
-          </p:cNvPr>
-          <p:cNvPicPr>
-            <a:picLocks noGrp="1" noChangeAspect="1"/>
-          </p:cNvPicPr>
-          <p:nvPr>
-            <p:ph idx="1"/>
-          </p:nvPr>
-        </p:nvPicPr>
-        <p:blipFill>
-          <a:blip r:embed="rId2">
-            <a:extLst>
-              <a:ext uri="{28A0092B-C50C-407E-A947-70E740481C1C}">
-                <a14:useLocalDpi xmlns:a14="http://schemas.microsoft.com/office/drawing/2010/main" val="0"/>
-              </a:ext>
-            </a:extLst>
-          </a:blip>
-          <a:stretch>
-            <a:fillRect/>
-          </a:stretch>
-        </p:blipFill>
-        <p:spPr>
-          <a:xfrm>
-            <a:off x="1928505" y="482451"/>
-            <a:ext cx="8334989" cy="5893098"/>
-          </a:xfrm>
-        </p:spPr>
-      </p:pic>
-      <p:sp>
-        <p:nvSpPr>
-          <p:cNvPr id="11" name="TextBox 10">
-            <a:extLst>
-              <a:ext uri="{FF2B5EF4-FFF2-40B4-BE49-F238E27FC236}">
-                <a16:creationId xmlns:a16="http://schemas.microsoft.com/office/drawing/2014/main" id="{58B8C341-C5B1-44D9-922D-878A7DC2EC79}"/>
-              </a:ext>
-            </a:extLst>
-          </p:cNvPr>
-          <p:cNvSpPr txBox="1"/>
-          <p:nvPr/>
-        </p:nvSpPr>
-        <p:spPr>
-          <a:xfrm>
-            <a:off x="6409678" y="6488668"/>
-            <a:ext cx="6578354" cy="369332"/>
-          </a:xfrm>
-          <a:prstGeom prst="rect">
-            <a:avLst/>
-          </a:prstGeom>
-          <a:noFill/>
-        </p:spPr>
-        <p:txBody>
-          <a:bodyPr wrap="square" rtlCol="0">
-            <a:spAutoFit/>
-          </a:bodyPr>
-          <a:lstStyle/>
-          <a:p>
-            <a:r>
-              <a:rPr lang="en-GB" dirty="0"/>
-              <a:t>https://conductrics.com/prediction-pooling-and-shrinkage/</a:t>
-            </a:r>
-          </a:p>
-        </p:txBody>
-      </p:sp>
-    </p:spTree>
-    <p:extLst>
-      <p:ext uri="{BB962C8B-B14F-4D97-AF65-F5344CB8AC3E}">
-        <p14:creationId xmlns:p14="http://schemas.microsoft.com/office/powerpoint/2010/main" val="565337253"/>
-      </p:ext>
-    </p:extLst>
-  </p:cSld>
-  <p:clrMapOvr>
-    <a:masterClrMapping/>
-  </p:clrMapOvr>
-</p:sld>
-</file>
-
-<file path=ppt/slides/slide7.xml><?xml version="1.0" encoding="utf-8"?>
-<p:sld xmlns:a="http://schemas.openxmlformats.org/drawingml/2006/main" xmlns:r="http://schemas.openxmlformats.org/officeDocument/2006/relationships" xmlns:p="http://schemas.openxmlformats.org/presentationml/2006/main">
-  <p:cSld>
-    <p:bg>
-      <p:bgPr>
-        <a:blipFill dpi="0" rotWithShape="1">
-          <a:blip r:embed="rId2">
-            <a:alphaModFix amt="72000"/>
-            <a:lum/>
-          </a:blip>
-          <a:srcRect/>
-          <a:stretch>
-            <a:fillRect t="-12000" b="-12000"/>
-          </a:stretch>
-        </a:blipFill>
-        <a:effectLst/>
-      </p:bgPr>
-    </p:bg>
-    <p:spTree>
-      <p:nvGrpSpPr>
-        <p:cNvPr id="1" name=""/>
-        <p:cNvGrpSpPr/>
-        <p:nvPr/>
-      </p:nvGrpSpPr>
-      <p:grpSpPr>
-        <a:xfrm>
-          <a:off x="0" y="0"/>
-          <a:ext cx="0" cy="0"/>
-          <a:chOff x="0" y="0"/>
-          <a:chExt cx="0" cy="0"/>
-        </a:xfrm>
-      </p:grpSpPr>
-      <p:sp>
-        <p:nvSpPr>
-          <p:cNvPr id="2" name="Title 1">
-            <a:extLst>
-              <a:ext uri="{FF2B5EF4-FFF2-40B4-BE49-F238E27FC236}">
-                <a16:creationId xmlns:a16="http://schemas.microsoft.com/office/drawing/2014/main" id="{4E9D77A6-51BA-4AFD-8FC0-057C46D4A64D}"/>
-              </a:ext>
-            </a:extLst>
-          </p:cNvPr>
-          <p:cNvSpPr>
-            <a:spLocks noGrp="1"/>
-          </p:cNvSpPr>
-          <p:nvPr>
-            <p:ph type="ctrTitle"/>
-          </p:nvPr>
-        </p:nvSpPr>
-        <p:spPr>
-          <a:xfrm rot="988642">
-            <a:off x="401882" y="1690746"/>
-            <a:ext cx="9144000" cy="1233725"/>
-          </a:xfrm>
-        </p:spPr>
-        <p:txBody>
-          <a:bodyPr/>
-          <a:lstStyle/>
-          <a:p>
-            <a:r>
-              <a:rPr lang="en-GB" b="1"/>
-              <a:t>Non-linear regressions</a:t>
-            </a:r>
-            <a:endParaRPr lang="en-GB" b="1" dirty="0"/>
-          </a:p>
-        </p:txBody>
-      </p:sp>
-    </p:spTree>
-    <p:extLst>
-      <p:ext uri="{BB962C8B-B14F-4D97-AF65-F5344CB8AC3E}">
-        <p14:creationId xmlns:p14="http://schemas.microsoft.com/office/powerpoint/2010/main" val="1166975239"/>
-      </p:ext>
-    </p:extLst>
-  </p:cSld>
-  <p:clrMapOvr>
-    <a:masterClrMapping/>
-  </p:clrMapOvr>
-</p:sld>
-</file>
-
-<file path=ppt/slides/slide8.xml><?xml version="1.0" encoding="utf-8"?>
-<p:sld xmlns:a="http://schemas.openxmlformats.org/drawingml/2006/main" xmlns:r="http://schemas.openxmlformats.org/officeDocument/2006/relationships" xmlns:p="http://schemas.openxmlformats.org/presentationml/2006/main">
-  <p:cSld>
-    <p:spTree>
-      <p:nvGrpSpPr>
-        <p:cNvPr id="1" name=""/>
-        <p:cNvGrpSpPr/>
-        <p:nvPr/>
-      </p:nvGrpSpPr>
-      <p:grpSpPr>
-        <a:xfrm>
-          <a:off x="0" y="0"/>
-          <a:ext cx="0" cy="0"/>
-          <a:chOff x="0" y="0"/>
-          <a:chExt cx="0" cy="0"/>
-        </a:xfrm>
-      </p:grpSpPr>
-      <p:sp>
-        <p:nvSpPr>
-          <p:cNvPr id="2" name="Title 1">
-            <a:extLst>
-              <a:ext uri="{FF2B5EF4-FFF2-40B4-BE49-F238E27FC236}">
-                <a16:creationId xmlns:a16="http://schemas.microsoft.com/office/drawing/2014/main" id="{3F5007A6-55EF-4B82-A19F-8E20F3F2EF4D}"/>
-              </a:ext>
-            </a:extLst>
-          </p:cNvPr>
-          <p:cNvSpPr>
-            <a:spLocks noGrp="1"/>
-          </p:cNvSpPr>
-          <p:nvPr>
-            <p:ph type="title"/>
-          </p:nvPr>
-        </p:nvSpPr>
-        <p:spPr/>
-        <p:txBody>
-          <a:bodyPr/>
-          <a:lstStyle/>
-          <a:p>
-            <a:r>
-              <a:rPr lang="en-GB" dirty="0"/>
-              <a:t>Adding climate drivers</a:t>
-            </a:r>
-          </a:p>
-        </p:txBody>
-      </p:sp>
-      <p:sp>
-        <p:nvSpPr>
-          <p:cNvPr id="3" name="Content Placeholder 2">
-            <a:extLst>
-              <a:ext uri="{FF2B5EF4-FFF2-40B4-BE49-F238E27FC236}">
-                <a16:creationId xmlns:a16="http://schemas.microsoft.com/office/drawing/2014/main" id="{4DB76920-20F8-4FFB-899A-2C05D0BAB9B1}"/>
-              </a:ext>
-            </a:extLst>
-          </p:cNvPr>
-          <p:cNvSpPr>
-            <a:spLocks noGrp="1"/>
-          </p:cNvSpPr>
-          <p:nvPr>
-            <p:ph idx="1"/>
-          </p:nvPr>
-        </p:nvSpPr>
-        <p:spPr/>
-        <p:txBody>
-          <a:bodyPr/>
-          <a:lstStyle/>
-          <a:p>
-            <a:r>
-              <a:rPr lang="en-GB" dirty="0"/>
-              <a:t>Fixed factors</a:t>
-            </a:r>
-          </a:p>
-          <a:p>
-            <a:endParaRPr lang="en-GB" dirty="0"/>
-          </a:p>
-          <a:p>
-            <a:r>
-              <a:rPr lang="en-GB" dirty="0"/>
-              <a:t>Interactions with other variables</a:t>
-            </a:r>
-          </a:p>
-          <a:p>
-            <a:pPr lvl="1"/>
-            <a:r>
-              <a:rPr lang="en-GB" dirty="0"/>
-              <a:t>Size</a:t>
-            </a:r>
-          </a:p>
-          <a:p>
-            <a:pPr lvl="1"/>
-            <a:r>
-              <a:rPr lang="en-GB" dirty="0"/>
-              <a:t>Populations</a:t>
-            </a:r>
-          </a:p>
-          <a:p>
-            <a:endParaRPr lang="en-GB" dirty="0"/>
-          </a:p>
-          <a:p>
-            <a:r>
-              <a:rPr lang="en-GB" dirty="0"/>
-              <a:t>How to pick climate driver candidates?</a:t>
-            </a:r>
-          </a:p>
-        </p:txBody>
-      </p:sp>
-    </p:spTree>
-    <p:extLst>
-      <p:ext uri="{BB962C8B-B14F-4D97-AF65-F5344CB8AC3E}">
-        <p14:creationId xmlns:p14="http://schemas.microsoft.com/office/powerpoint/2010/main" val="3384981871"/>
-      </p:ext>
-    </p:extLst>
-  </p:cSld>
-  <p:clrMapOvr>
-    <a:masterClrMapping/>
-  </p:clrMapOvr>
-</p:sld>
-</file>
-
-<file path=ppt/slides/slide9.xml><?xml version="1.0" encoding="utf-8"?>
-<p:sld xmlns:a="http://schemas.openxmlformats.org/drawingml/2006/main" xmlns:r="http://schemas.openxmlformats.org/officeDocument/2006/relationships" xmlns:p="http://schemas.openxmlformats.org/presentationml/2006/main">
-  <p:cSld>
-    <p:spTree>
-      <p:nvGrpSpPr>
-        <p:cNvPr id="1" name=""/>
-        <p:cNvGrpSpPr/>
-        <p:nvPr/>
-      </p:nvGrpSpPr>
-      <p:grpSpPr>
-        <a:xfrm>
-          <a:off x="0" y="0"/>
-          <a:ext cx="0" cy="0"/>
-          <a:chOff x="0" y="0"/>
-          <a:chExt cx="0" cy="0"/>
-        </a:xfrm>
-      </p:grpSpPr>
-      <p:sp>
-        <p:nvSpPr>
-          <p:cNvPr id="2" name="Title 1">
-            <a:extLst>
-              <a:ext uri="{FF2B5EF4-FFF2-40B4-BE49-F238E27FC236}">
                 <a16:creationId xmlns:a16="http://schemas.microsoft.com/office/drawing/2014/main" id="{FA812A22-5C71-49BD-997E-A370A50BA46C}"/>
               </a:ext>
             </a:extLst>
@@ -5137,8 +3656,8 @@
           </a:p>
         </p:txBody>
       </p:sp>
-      <mc:AlternateContent xmlns:mc="http://schemas.openxmlformats.org/markup-compatibility/2006">
-        <mc:Choice xmlns:a14="http://schemas.microsoft.com/office/drawing/2010/main" Requires="a14">
+      <mc:AlternateContent xmlns:mc="http://schemas.openxmlformats.org/markup-compatibility/2006" xmlns:a14="http://schemas.microsoft.com/office/drawing/2010/main">
+        <mc:Choice Requires="a14">
           <p:sp>
             <p:nvSpPr>
               <p:cNvPr id="14" name="TextBox 13">
@@ -5167,6 +3686,7 @@
               </a:bodyPr>
               <a:lstStyle/>
               <a:p>
+                <a:pPr/>
                 <a14:m>
                   <m:oMathPara xmlns:m="http://schemas.openxmlformats.org/officeDocument/2006/math">
                     <m:oMathParaPr>
@@ -5313,7 +3833,7 @@
             </p:txBody>
           </p:sp>
         </mc:Choice>
-        <mc:Fallback>
+        <mc:Fallback xmlns="">
           <p:sp>
             <p:nvSpPr>
               <p:cNvPr id="14" name="TextBox 13">
@@ -5482,8 +4002,8 @@
           </a:p>
         </p:txBody>
       </p:sp>
-      <mc:AlternateContent xmlns:mc="http://schemas.openxmlformats.org/markup-compatibility/2006">
-        <mc:Choice xmlns:a14="http://schemas.microsoft.com/office/drawing/2010/main" Requires="a14">
+      <mc:AlternateContent xmlns:mc="http://schemas.openxmlformats.org/markup-compatibility/2006" xmlns:a14="http://schemas.microsoft.com/office/drawing/2010/main">
+        <mc:Choice Requires="a14">
           <p:sp>
             <p:nvSpPr>
               <p:cNvPr id="28" name="TextBox 27">
@@ -5512,6 +4032,7 @@
               </a:bodyPr>
               <a:lstStyle/>
               <a:p>
+                <a:pPr/>
                 <a14:m>
                   <m:oMathPara xmlns:m="http://schemas.openxmlformats.org/officeDocument/2006/math">
                     <m:oMathParaPr>
@@ -5674,7 +4195,7 @@
             </p:txBody>
           </p:sp>
         </mc:Choice>
-        <mc:Fallback>
+        <mc:Fallback xmlns="">
           <p:sp>
             <p:nvSpPr>
               <p:cNvPr id="28" name="TextBox 27">
@@ -6152,6 +4673,1745 @@
 </p:sld>
 </file>
 
+<file path=ppt/slides/slide11.xml><?xml version="1.0" encoding="utf-8"?>
+<p:sld xmlns:a="http://schemas.openxmlformats.org/drawingml/2006/main" xmlns:r="http://schemas.openxmlformats.org/officeDocument/2006/relationships" xmlns:p="http://schemas.openxmlformats.org/presentationml/2006/main">
+  <p:cSld>
+    <p:spTree>
+      <p:nvGrpSpPr>
+        <p:cNvPr id="1" name=""/>
+        <p:cNvGrpSpPr/>
+        <p:nvPr/>
+      </p:nvGrpSpPr>
+      <p:grpSpPr>
+        <a:xfrm>
+          <a:off x="0" y="0"/>
+          <a:ext cx="0" cy="0"/>
+          <a:chOff x="0" y="0"/>
+          <a:chExt cx="0" cy="0"/>
+        </a:xfrm>
+      </p:grpSpPr>
+      <p:sp>
+        <p:nvSpPr>
+          <p:cNvPr id="2" name="Title 1">
+            <a:extLst>
+              <a:ext uri="{FF2B5EF4-FFF2-40B4-BE49-F238E27FC236}">
+                <a16:creationId xmlns:a16="http://schemas.microsoft.com/office/drawing/2014/main" id="{E6D74056-F9AE-41D3-8C35-DFCDCF859D77}"/>
+              </a:ext>
+            </a:extLst>
+          </p:cNvPr>
+          <p:cNvSpPr>
+            <a:spLocks noGrp="1"/>
+          </p:cNvSpPr>
+          <p:nvPr>
+            <p:ph type="title"/>
+          </p:nvPr>
+        </p:nvSpPr>
+        <p:spPr/>
+        <p:txBody>
+          <a:bodyPr/>
+          <a:lstStyle/>
+          <a:p>
+            <a:r>
+              <a:rPr lang="en-GB" dirty="0"/>
+              <a:t>Why not just throw in everything?</a:t>
+            </a:r>
+          </a:p>
+        </p:txBody>
+      </p:sp>
+      <p:sp>
+        <p:nvSpPr>
+          <p:cNvPr id="3" name="Content Placeholder 2">
+            <a:extLst>
+              <a:ext uri="{FF2B5EF4-FFF2-40B4-BE49-F238E27FC236}">
+                <a16:creationId xmlns:a16="http://schemas.microsoft.com/office/drawing/2014/main" id="{F41D2133-4CC7-4273-9BA5-FED36FFB0C22}"/>
+              </a:ext>
+            </a:extLst>
+          </p:cNvPr>
+          <p:cNvSpPr>
+            <a:spLocks noGrp="1"/>
+          </p:cNvSpPr>
+          <p:nvPr>
+            <p:ph sz="half" idx="1"/>
+          </p:nvPr>
+        </p:nvSpPr>
+        <p:spPr>
+          <a:xfrm>
+            <a:off x="838200" y="1825625"/>
+            <a:ext cx="10472606" cy="4351338"/>
+          </a:xfrm>
+        </p:spPr>
+        <p:txBody>
+          <a:bodyPr/>
+          <a:lstStyle/>
+          <a:p>
+            <a:r>
+              <a:rPr lang="en-GB" dirty="0"/>
+              <a:t>Overfitting vs. underfitting</a:t>
+            </a:r>
+          </a:p>
+          <a:p>
+            <a:r>
+              <a:rPr lang="en-GB" dirty="0"/>
+              <a:t>Within sample vs. outside sample</a:t>
+            </a:r>
+          </a:p>
+        </p:txBody>
+      </p:sp>
+      <p:pic>
+        <p:nvPicPr>
+          <p:cNvPr id="6" name="Content Placeholder 5">
+            <a:extLst>
+              <a:ext uri="{FF2B5EF4-FFF2-40B4-BE49-F238E27FC236}">
+                <a16:creationId xmlns:a16="http://schemas.microsoft.com/office/drawing/2014/main" id="{BDC83D89-07D0-4344-8865-458D23E490B0}"/>
+              </a:ext>
+            </a:extLst>
+          </p:cNvPr>
+          <p:cNvPicPr>
+            <a:picLocks noGrp="1" noChangeAspect="1"/>
+          </p:cNvPicPr>
+          <p:nvPr>
+            <p:ph sz="half" idx="2"/>
+          </p:nvPr>
+        </p:nvPicPr>
+        <p:blipFill>
+          <a:blip r:embed="rId2">
+            <a:extLst>
+              <a:ext uri="{28A0092B-C50C-407E-A947-70E740481C1C}">
+                <a14:useLocalDpi xmlns:a14="http://schemas.microsoft.com/office/drawing/2010/main" val="0"/>
+              </a:ext>
+            </a:extLst>
+          </a:blip>
+          <a:stretch>
+            <a:fillRect/>
+          </a:stretch>
+        </p:blipFill>
+        <p:spPr>
+          <a:xfrm>
+            <a:off x="728793" y="2876537"/>
+            <a:ext cx="10582013" cy="3677836"/>
+          </a:xfrm>
+        </p:spPr>
+      </p:pic>
+      <p:sp>
+        <p:nvSpPr>
+          <p:cNvPr id="7" name="TextBox 6">
+            <a:extLst>
+              <a:ext uri="{FF2B5EF4-FFF2-40B4-BE49-F238E27FC236}">
+                <a16:creationId xmlns:a16="http://schemas.microsoft.com/office/drawing/2014/main" id="{EBF46B33-6D33-4D95-A98B-B0FA7C91E39A}"/>
+              </a:ext>
+            </a:extLst>
+          </p:cNvPr>
+          <p:cNvSpPr txBox="1"/>
+          <p:nvPr/>
+        </p:nvSpPr>
+        <p:spPr>
+          <a:xfrm>
+            <a:off x="9068132" y="6488668"/>
+            <a:ext cx="3123868" cy="369332"/>
+          </a:xfrm>
+          <a:prstGeom prst="rect">
+            <a:avLst/>
+          </a:prstGeom>
+          <a:noFill/>
+        </p:spPr>
+        <p:txBody>
+          <a:bodyPr wrap="none" rtlCol="0">
+            <a:spAutoFit/>
+          </a:bodyPr>
+          <a:lstStyle/>
+          <a:p>
+            <a:r>
+              <a:rPr lang="en-GB" dirty="0"/>
+              <a:t>https://medium.com/greyatom</a:t>
+            </a:r>
+          </a:p>
+        </p:txBody>
+      </p:sp>
+    </p:spTree>
+    <p:extLst>
+      <p:ext uri="{BB962C8B-B14F-4D97-AF65-F5344CB8AC3E}">
+        <p14:creationId xmlns:p14="http://schemas.microsoft.com/office/powerpoint/2010/main" val="898158929"/>
+      </p:ext>
+    </p:extLst>
+  </p:cSld>
+  <p:clrMapOvr>
+    <a:masterClrMapping/>
+  </p:clrMapOvr>
+</p:sld>
+</file>
+
+<file path=ppt/slides/slide12.xml><?xml version="1.0" encoding="utf-8"?>
+<p:sld xmlns:a="http://schemas.openxmlformats.org/drawingml/2006/main" xmlns:r="http://schemas.openxmlformats.org/officeDocument/2006/relationships" xmlns:p="http://schemas.openxmlformats.org/presentationml/2006/main">
+  <p:cSld>
+    <p:spTree>
+      <p:nvGrpSpPr>
+        <p:cNvPr id="1" name=""/>
+        <p:cNvGrpSpPr/>
+        <p:nvPr/>
+      </p:nvGrpSpPr>
+      <p:grpSpPr>
+        <a:xfrm>
+          <a:off x="0" y="0"/>
+          <a:ext cx="0" cy="0"/>
+          <a:chOff x="0" y="0"/>
+          <a:chExt cx="0" cy="0"/>
+        </a:xfrm>
+      </p:grpSpPr>
+      <p:sp>
+        <p:nvSpPr>
+          <p:cNvPr id="2" name="Title 1">
+            <a:extLst>
+              <a:ext uri="{FF2B5EF4-FFF2-40B4-BE49-F238E27FC236}">
+                <a16:creationId xmlns:a16="http://schemas.microsoft.com/office/drawing/2014/main" id="{15A2D47B-6A5C-415E-A326-4099525BF967}"/>
+              </a:ext>
+            </a:extLst>
+          </p:cNvPr>
+          <p:cNvSpPr>
+            <a:spLocks noGrp="1"/>
+          </p:cNvSpPr>
+          <p:nvPr>
+            <p:ph type="title"/>
+          </p:nvPr>
+        </p:nvSpPr>
+        <p:spPr/>
+        <p:txBody>
+          <a:bodyPr/>
+          <a:lstStyle/>
+          <a:p>
+            <a:r>
+              <a:rPr lang="en-GB" dirty="0"/>
+              <a:t>Even if you do everything right</a:t>
+            </a:r>
+          </a:p>
+        </p:txBody>
+      </p:sp>
+      <p:sp>
+        <p:nvSpPr>
+          <p:cNvPr id="10" name="Content Placeholder 9">
+            <a:extLst>
+              <a:ext uri="{FF2B5EF4-FFF2-40B4-BE49-F238E27FC236}">
+                <a16:creationId xmlns:a16="http://schemas.microsoft.com/office/drawing/2014/main" id="{D6CF4DF3-94FF-401D-BA36-7BFB0AFE9540}"/>
+              </a:ext>
+            </a:extLst>
+          </p:cNvPr>
+          <p:cNvSpPr>
+            <a:spLocks noGrp="1"/>
+          </p:cNvSpPr>
+          <p:nvPr>
+            <p:ph idx="1"/>
+          </p:nvPr>
+        </p:nvSpPr>
+        <p:spPr/>
+        <p:txBody>
+          <a:bodyPr/>
+          <a:lstStyle/>
+          <a:p>
+            <a:r>
+              <a:rPr lang="en-GB" dirty="0"/>
+              <a:t>It’s not an exact science</a:t>
+            </a:r>
+          </a:p>
+          <a:p>
+            <a:endParaRPr lang="en-GB" dirty="0"/>
+          </a:p>
+          <a:p>
+            <a:r>
+              <a:rPr lang="en-GB" dirty="0"/>
+              <a:t>Uncertainties strengthen our research</a:t>
+            </a:r>
+          </a:p>
+        </p:txBody>
+      </p:sp>
+      <p:pic>
+        <p:nvPicPr>
+          <p:cNvPr id="11" name="Picture 10">
+            <a:extLst>
+              <a:ext uri="{FF2B5EF4-FFF2-40B4-BE49-F238E27FC236}">
+                <a16:creationId xmlns:a16="http://schemas.microsoft.com/office/drawing/2014/main" id="{4E672852-0698-42C3-AF54-D040601CDEE0}"/>
+              </a:ext>
+            </a:extLst>
+          </p:cNvPr>
+          <p:cNvPicPr>
+            <a:picLocks noChangeAspect="1"/>
+          </p:cNvPicPr>
+          <p:nvPr/>
+        </p:nvPicPr>
+        <p:blipFill rotWithShape="1">
+          <a:blip r:embed="rId2"/>
+          <a:srcRect b="52334"/>
+          <a:stretch/>
+        </p:blipFill>
+        <p:spPr>
+          <a:xfrm>
+            <a:off x="7920650" y="365125"/>
+            <a:ext cx="3433150" cy="5802592"/>
+          </a:xfrm>
+          <a:prstGeom prst="rect">
+            <a:avLst/>
+          </a:prstGeom>
+        </p:spPr>
+      </p:pic>
+      <p:sp>
+        <p:nvSpPr>
+          <p:cNvPr id="12" name="TextBox 11">
+            <a:extLst>
+              <a:ext uri="{FF2B5EF4-FFF2-40B4-BE49-F238E27FC236}">
+                <a16:creationId xmlns:a16="http://schemas.microsoft.com/office/drawing/2014/main" id="{1F8A2FB0-D602-42E0-9E4A-54FD39E315B9}"/>
+              </a:ext>
+            </a:extLst>
+          </p:cNvPr>
+          <p:cNvSpPr txBox="1"/>
+          <p:nvPr/>
+        </p:nvSpPr>
+        <p:spPr>
+          <a:xfrm>
+            <a:off x="9823829" y="6176963"/>
+            <a:ext cx="1529971" cy="369332"/>
+          </a:xfrm>
+          <a:prstGeom prst="rect">
+            <a:avLst/>
+          </a:prstGeom>
+          <a:noFill/>
+        </p:spPr>
+        <p:txBody>
+          <a:bodyPr wrap="none" rtlCol="0">
+            <a:spAutoFit/>
+          </a:bodyPr>
+          <a:lstStyle/>
+          <a:p>
+            <a:r>
+              <a:rPr lang="en-GB" dirty="0"/>
+              <a:t>Iler et al, 2019</a:t>
+            </a:r>
+          </a:p>
+        </p:txBody>
+      </p:sp>
+    </p:spTree>
+    <p:extLst>
+      <p:ext uri="{BB962C8B-B14F-4D97-AF65-F5344CB8AC3E}">
+        <p14:creationId xmlns:p14="http://schemas.microsoft.com/office/powerpoint/2010/main" val="1862097196"/>
+      </p:ext>
+    </p:extLst>
+  </p:cSld>
+  <p:clrMapOvr>
+    <a:masterClrMapping/>
+  </p:clrMapOvr>
+</p:sld>
+</file>
+
+<file path=ppt/slides/slide2.xml><?xml version="1.0" encoding="utf-8"?>
+<p:sld xmlns:a="http://schemas.openxmlformats.org/drawingml/2006/main" xmlns:r="http://schemas.openxmlformats.org/officeDocument/2006/relationships" xmlns:p="http://schemas.openxmlformats.org/presentationml/2006/main">
+  <p:cSld>
+    <p:spTree>
+      <p:nvGrpSpPr>
+        <p:cNvPr id="1" name=""/>
+        <p:cNvGrpSpPr/>
+        <p:nvPr/>
+      </p:nvGrpSpPr>
+      <p:grpSpPr>
+        <a:xfrm>
+          <a:off x="0" y="0"/>
+          <a:ext cx="0" cy="0"/>
+          <a:chOff x="0" y="0"/>
+          <a:chExt cx="0" cy="0"/>
+        </a:xfrm>
+      </p:grpSpPr>
+      <p:sp>
+        <p:nvSpPr>
+          <p:cNvPr id="2" name="Title 1">
+            <a:extLst>
+              <a:ext uri="{FF2B5EF4-FFF2-40B4-BE49-F238E27FC236}">
+                <a16:creationId xmlns:a16="http://schemas.microsoft.com/office/drawing/2014/main" id="{4CEFFDE4-0B7C-412B-968B-AFC9BE9A32D6}"/>
+              </a:ext>
+            </a:extLst>
+          </p:cNvPr>
+          <p:cNvSpPr>
+            <a:spLocks noGrp="1"/>
+          </p:cNvSpPr>
+          <p:nvPr>
+            <p:ph type="title"/>
+          </p:nvPr>
+        </p:nvSpPr>
+        <p:spPr/>
+        <p:txBody>
+          <a:bodyPr/>
+          <a:lstStyle/>
+          <a:p>
+            <a:r>
+              <a:rPr lang="en-GB" dirty="0"/>
+              <a:t>Linear regressions</a:t>
+            </a:r>
+            <a:br>
+              <a:rPr lang="en-GB" dirty="0"/>
+            </a:br>
+            <a:r>
+              <a:rPr lang="en-GB" dirty="0"/>
+              <a:t>(LM)</a:t>
+            </a:r>
+          </a:p>
+        </p:txBody>
+      </p:sp>
+      <p:sp>
+        <p:nvSpPr>
+          <p:cNvPr id="3" name="Content Placeholder 2">
+            <a:extLst>
+              <a:ext uri="{FF2B5EF4-FFF2-40B4-BE49-F238E27FC236}">
+                <a16:creationId xmlns:a16="http://schemas.microsoft.com/office/drawing/2014/main" id="{0C85B67F-2489-4490-AEE8-CB80F630C4FC}"/>
+              </a:ext>
+            </a:extLst>
+          </p:cNvPr>
+          <p:cNvSpPr>
+            <a:spLocks noGrp="1"/>
+          </p:cNvSpPr>
+          <p:nvPr>
+            <p:ph idx="1"/>
+          </p:nvPr>
+        </p:nvSpPr>
+        <p:spPr>
+          <a:xfrm>
+            <a:off x="838200" y="1825625"/>
+            <a:ext cx="4657078" cy="4351338"/>
+          </a:xfrm>
+        </p:spPr>
+        <p:txBody>
+          <a:bodyPr/>
+          <a:lstStyle/>
+          <a:p>
+            <a:r>
+              <a:rPr lang="en-GB" dirty="0"/>
+              <a:t>Assumes a linear relationship between x and y</a:t>
+            </a:r>
+          </a:p>
+          <a:p>
+            <a:endParaRPr lang="en-GB" dirty="0"/>
+          </a:p>
+          <a:p>
+            <a:endParaRPr lang="en-GB" dirty="0"/>
+          </a:p>
+          <a:p>
+            <a:r>
+              <a:rPr lang="en-GB" dirty="0"/>
+              <a:t>Variance in residuals (estimate errors) is assumed to be normal</a:t>
+            </a:r>
+          </a:p>
+        </p:txBody>
+      </p:sp>
+      <p:pic>
+        <p:nvPicPr>
+          <p:cNvPr id="5" name="Picture 4">
+            <a:extLst>
+              <a:ext uri="{FF2B5EF4-FFF2-40B4-BE49-F238E27FC236}">
+                <a16:creationId xmlns:a16="http://schemas.microsoft.com/office/drawing/2014/main" id="{BAEF08E2-FA5E-482C-8DE9-57E3B7B8F5CB}"/>
+              </a:ext>
+            </a:extLst>
+          </p:cNvPr>
+          <p:cNvPicPr>
+            <a:picLocks noChangeAspect="1"/>
+          </p:cNvPicPr>
+          <p:nvPr/>
+        </p:nvPicPr>
+        <p:blipFill>
+          <a:blip r:embed="rId2">
+            <a:extLst>
+              <a:ext uri="{28A0092B-C50C-407E-A947-70E740481C1C}">
+                <a14:useLocalDpi xmlns:a14="http://schemas.microsoft.com/office/drawing/2010/main" val="0"/>
+              </a:ext>
+            </a:extLst>
+          </a:blip>
+          <a:stretch>
+            <a:fillRect/>
+          </a:stretch>
+        </p:blipFill>
+        <p:spPr>
+          <a:xfrm>
+            <a:off x="5673570" y="1142983"/>
+            <a:ext cx="6400847" cy="4572033"/>
+          </a:xfrm>
+          <a:prstGeom prst="rect">
+            <a:avLst/>
+          </a:prstGeom>
+        </p:spPr>
+      </p:pic>
+      <mc:AlternateContent xmlns:mc="http://schemas.openxmlformats.org/markup-compatibility/2006" xmlns:a14="http://schemas.microsoft.com/office/drawing/2010/main">
+        <mc:Choice Requires="a14">
+          <p:sp>
+            <p:nvSpPr>
+              <p:cNvPr id="6" name="TextBox 5">
+                <a:extLst>
+                  <a:ext uri="{FF2B5EF4-FFF2-40B4-BE49-F238E27FC236}">
+                    <a16:creationId xmlns:a16="http://schemas.microsoft.com/office/drawing/2014/main" id="{1A5C3295-DA4D-455B-93D4-64BCF526D519}"/>
+                  </a:ext>
+                </a:extLst>
+              </p:cNvPr>
+              <p:cNvSpPr txBox="1"/>
+              <p:nvPr/>
+            </p:nvSpPr>
+            <p:spPr>
+              <a:xfrm>
+                <a:off x="1968975" y="2900528"/>
+                <a:ext cx="2395528" cy="461665"/>
+              </a:xfrm>
+              <a:prstGeom prst="rect">
+                <a:avLst/>
+              </a:prstGeom>
+              <a:noFill/>
+            </p:spPr>
+            <p:txBody>
+              <a:bodyPr wrap="none" rtlCol="0">
+                <a:spAutoFit/>
+              </a:bodyPr>
+              <a:lstStyle/>
+              <a:p>
+                <a14:m>
+                  <m:oMath xmlns:m="http://schemas.openxmlformats.org/officeDocument/2006/math">
+                    <m:r>
+                      <a:rPr lang="en-US" sz="2400" b="0" i="1" smtClean="0">
+                        <a:latin typeface="Cambria Math" panose="02040503050406030204" pitchFamily="18" charset="0"/>
+                      </a:rPr>
+                      <m:t>𝑌</m:t>
+                    </m:r>
+                    <m:r>
+                      <a:rPr lang="en-US" sz="2400" b="0" i="1" smtClean="0">
+                        <a:latin typeface="Cambria Math" panose="02040503050406030204" pitchFamily="18" charset="0"/>
+                      </a:rPr>
+                      <m:t>=</m:t>
+                    </m:r>
+                    <m:sSub>
+                      <m:sSubPr>
+                        <m:ctrlPr>
+                          <a:rPr lang="en-US" sz="2400" b="0" i="1" smtClean="0">
+                            <a:latin typeface="Cambria Math" panose="02040503050406030204" pitchFamily="18" charset="0"/>
+                          </a:rPr>
+                        </m:ctrlPr>
+                      </m:sSubPr>
+                      <m:e>
+                        <m:r>
+                          <m:rPr>
+                            <m:sty m:val="p"/>
+                          </m:rPr>
+                          <a:rPr lang="el-GR" sz="2400" b="0" i="1" smtClean="0">
+                            <a:latin typeface="Cambria Math" panose="02040503050406030204" pitchFamily="18" charset="0"/>
+                          </a:rPr>
+                          <m:t>β</m:t>
+                        </m:r>
+                      </m:e>
+                      <m:sub>
+                        <m:r>
+                          <a:rPr lang="en-US" sz="2400" b="0" i="1" smtClean="0">
+                            <a:latin typeface="Cambria Math" panose="02040503050406030204" pitchFamily="18" charset="0"/>
+                          </a:rPr>
+                          <m:t>0</m:t>
+                        </m:r>
+                      </m:sub>
+                    </m:sSub>
+                    <m:r>
+                      <a:rPr lang="en-US" sz="2400" b="0" i="1" smtClean="0">
+                        <a:latin typeface="Cambria Math" panose="02040503050406030204" pitchFamily="18" charset="0"/>
+                      </a:rPr>
+                      <m:t>+</m:t>
+                    </m:r>
+                    <m:r>
+                      <a:rPr lang="en-US" sz="2400" b="0" i="1" smtClean="0">
+                        <a:latin typeface="Cambria Math" panose="02040503050406030204" pitchFamily="18" charset="0"/>
+                      </a:rPr>
+                      <m:t>𝑋</m:t>
+                    </m:r>
+                    <m:sSub>
+                      <m:sSubPr>
+                        <m:ctrlPr>
+                          <a:rPr lang="en-US" sz="2400" b="0" i="1" smtClean="0">
+                            <a:latin typeface="Cambria Math" panose="02040503050406030204" pitchFamily="18" charset="0"/>
+                          </a:rPr>
+                        </m:ctrlPr>
+                      </m:sSubPr>
+                      <m:e>
+                        <m:r>
+                          <a:rPr lang="en-US" sz="2400" b="0" i="1" smtClean="0">
+                            <a:latin typeface="Cambria Math" panose="02040503050406030204" pitchFamily="18" charset="0"/>
+                          </a:rPr>
+                          <m:t>∗</m:t>
+                        </m:r>
+                        <m:r>
+                          <m:rPr>
+                            <m:sty m:val="p"/>
+                          </m:rPr>
+                          <a:rPr lang="el-GR" sz="2400" b="0" i="1" smtClean="0">
+                            <a:latin typeface="Cambria Math" panose="02040503050406030204" pitchFamily="18" charset="0"/>
+                          </a:rPr>
+                          <m:t>β</m:t>
+                        </m:r>
+                      </m:e>
+                      <m:sub>
+                        <m:r>
+                          <a:rPr lang="en-US" sz="2400" b="0" i="1" smtClean="0">
+                            <a:latin typeface="Cambria Math" panose="02040503050406030204" pitchFamily="18" charset="0"/>
+                          </a:rPr>
+                          <m:t>1</m:t>
+                        </m:r>
+                      </m:sub>
+                    </m:sSub>
+                  </m:oMath>
+                </a14:m>
+                <a:r>
+                  <a:rPr lang="en-GB" sz="2400" dirty="0"/>
+                  <a:t>  </a:t>
+                </a:r>
+              </a:p>
+            </p:txBody>
+          </p:sp>
+        </mc:Choice>
+        <mc:Fallback xmlns="">
+          <p:sp>
+            <p:nvSpPr>
+              <p:cNvPr id="6" name="TextBox 5">
+                <a:extLst>
+                  <a:ext uri="{FF2B5EF4-FFF2-40B4-BE49-F238E27FC236}">
+                    <a16:creationId xmlns:a16="http://schemas.microsoft.com/office/drawing/2014/main" id="{1A5C3295-DA4D-455B-93D4-64BCF526D519}"/>
+                  </a:ext>
+                </a:extLst>
+              </p:cNvPr>
+              <p:cNvSpPr txBox="1">
+                <a:spLocks noRot="1" noChangeAspect="1" noMove="1" noResize="1" noEditPoints="1" noAdjustHandles="1" noChangeArrowheads="1" noChangeShapeType="1" noTextEdit="1"/>
+              </p:cNvSpPr>
+              <p:nvPr/>
+            </p:nvSpPr>
+            <p:spPr>
+              <a:xfrm>
+                <a:off x="1968975" y="2900528"/>
+                <a:ext cx="2395528" cy="461665"/>
+              </a:xfrm>
+              <a:prstGeom prst="rect">
+                <a:avLst/>
+              </a:prstGeom>
+              <a:blipFill>
+                <a:blip r:embed="rId3"/>
+                <a:stretch>
+                  <a:fillRect l="-763" b="-17105"/>
+                </a:stretch>
+              </a:blipFill>
+            </p:spPr>
+            <p:txBody>
+              <a:bodyPr/>
+              <a:lstStyle/>
+              <a:p>
+                <a:r>
+                  <a:rPr lang="en-GB">
+                    <a:noFill/>
+                  </a:rPr>
+                  <a:t> </a:t>
+                </a:r>
+              </a:p>
+            </p:txBody>
+          </p:sp>
+        </mc:Fallback>
+      </mc:AlternateContent>
+      <p:sp>
+        <p:nvSpPr>
+          <p:cNvPr id="7" name="TextBox 6">
+            <a:extLst>
+              <a:ext uri="{FF2B5EF4-FFF2-40B4-BE49-F238E27FC236}">
+                <a16:creationId xmlns:a16="http://schemas.microsoft.com/office/drawing/2014/main" id="{876AD966-F990-4F69-BBF2-1CB726A09842}"/>
+              </a:ext>
+            </a:extLst>
+          </p:cNvPr>
+          <p:cNvSpPr txBox="1"/>
+          <p:nvPr/>
+        </p:nvSpPr>
+        <p:spPr>
+          <a:xfrm>
+            <a:off x="6590402" y="6488668"/>
+            <a:ext cx="5601598" cy="369332"/>
+          </a:xfrm>
+          <a:prstGeom prst="rect">
+            <a:avLst/>
+          </a:prstGeom>
+          <a:noFill/>
+        </p:spPr>
+        <p:txBody>
+          <a:bodyPr wrap="none" rtlCol="0">
+            <a:spAutoFit/>
+          </a:bodyPr>
+          <a:lstStyle/>
+          <a:p>
+            <a:r>
+              <a:rPr lang="en-GB" dirty="0"/>
+              <a:t>https://bookdown.org/ekothe/navarro26/regression.html</a:t>
+            </a:r>
+          </a:p>
+        </p:txBody>
+      </p:sp>
+    </p:spTree>
+    <p:extLst>
+      <p:ext uri="{BB962C8B-B14F-4D97-AF65-F5344CB8AC3E}">
+        <p14:creationId xmlns:p14="http://schemas.microsoft.com/office/powerpoint/2010/main" val="3686086653"/>
+      </p:ext>
+    </p:extLst>
+  </p:cSld>
+  <p:clrMapOvr>
+    <a:masterClrMapping/>
+  </p:clrMapOvr>
+</p:sld>
+</file>
+
+<file path=ppt/slides/slide3.xml><?xml version="1.0" encoding="utf-8"?>
+<p:sld xmlns:a="http://schemas.openxmlformats.org/drawingml/2006/main" xmlns:r="http://schemas.openxmlformats.org/officeDocument/2006/relationships" xmlns:p="http://schemas.openxmlformats.org/presentationml/2006/main">
+  <p:cSld>
+    <p:spTree>
+      <p:nvGrpSpPr>
+        <p:cNvPr id="1" name=""/>
+        <p:cNvGrpSpPr/>
+        <p:nvPr/>
+      </p:nvGrpSpPr>
+      <p:grpSpPr>
+        <a:xfrm>
+          <a:off x="0" y="0"/>
+          <a:ext cx="0" cy="0"/>
+          <a:chOff x="0" y="0"/>
+          <a:chExt cx="0" cy="0"/>
+        </a:xfrm>
+      </p:grpSpPr>
+      <p:sp>
+        <p:nvSpPr>
+          <p:cNvPr id="2" name="Title 1">
+            <a:extLst>
+              <a:ext uri="{FF2B5EF4-FFF2-40B4-BE49-F238E27FC236}">
+                <a16:creationId xmlns:a16="http://schemas.microsoft.com/office/drawing/2014/main" id="{F20B95BF-CDDB-49FD-8287-4A97F34DF7E9}"/>
+              </a:ext>
+            </a:extLst>
+          </p:cNvPr>
+          <p:cNvSpPr>
+            <a:spLocks noGrp="1"/>
+          </p:cNvSpPr>
+          <p:nvPr>
+            <p:ph type="title"/>
+          </p:nvPr>
+        </p:nvSpPr>
+        <p:spPr/>
+        <p:txBody>
+          <a:bodyPr/>
+          <a:lstStyle/>
+          <a:p>
+            <a:r>
+              <a:rPr lang="en-GB" dirty="0"/>
+              <a:t>Generalized linear regressions</a:t>
+            </a:r>
+            <a:br>
+              <a:rPr lang="en-GB" dirty="0"/>
+            </a:br>
+            <a:r>
+              <a:rPr lang="en-GB" dirty="0"/>
+              <a:t>(GLM)</a:t>
+            </a:r>
+          </a:p>
+        </p:txBody>
+      </p:sp>
+      <p:sp>
+        <p:nvSpPr>
+          <p:cNvPr id="3" name="Content Placeholder 2">
+            <a:extLst>
+              <a:ext uri="{FF2B5EF4-FFF2-40B4-BE49-F238E27FC236}">
+                <a16:creationId xmlns:a16="http://schemas.microsoft.com/office/drawing/2014/main" id="{7F7FDAB5-FCE6-4FE4-B9BB-B06D29ED82FB}"/>
+              </a:ext>
+            </a:extLst>
+          </p:cNvPr>
+          <p:cNvSpPr>
+            <a:spLocks noGrp="1"/>
+          </p:cNvSpPr>
+          <p:nvPr>
+            <p:ph idx="1"/>
+          </p:nvPr>
+        </p:nvSpPr>
+        <p:spPr>
+          <a:xfrm>
+            <a:off x="838200" y="1825625"/>
+            <a:ext cx="4222072" cy="4351338"/>
+          </a:xfrm>
+        </p:spPr>
+        <p:txBody>
+          <a:bodyPr/>
+          <a:lstStyle/>
+          <a:p>
+            <a:r>
+              <a:rPr lang="en-GB" dirty="0"/>
+              <a:t>Relationship between x and y does not have to be linear:</a:t>
+            </a:r>
+          </a:p>
+          <a:p>
+            <a:endParaRPr lang="en-GB" dirty="0"/>
+          </a:p>
+          <a:p>
+            <a:r>
+              <a:rPr lang="en-GB" dirty="0"/>
+              <a:t>Binomial (Bernoulli)</a:t>
+            </a:r>
+          </a:p>
+          <a:p>
+            <a:r>
+              <a:rPr lang="en-GB" dirty="0"/>
+              <a:t>Poisson</a:t>
+            </a:r>
+          </a:p>
+          <a:p>
+            <a:r>
+              <a:rPr lang="en-GB" dirty="0"/>
+              <a:t>Gamma</a:t>
+            </a:r>
+          </a:p>
+          <a:p>
+            <a:r>
+              <a:rPr lang="en-GB" dirty="0"/>
+              <a:t>Exponential</a:t>
+            </a:r>
+          </a:p>
+          <a:p>
+            <a:r>
+              <a:rPr lang="en-GB" dirty="0"/>
+              <a:t>And many more</a:t>
+            </a:r>
+          </a:p>
+        </p:txBody>
+      </p:sp>
+      <p:pic>
+        <p:nvPicPr>
+          <p:cNvPr id="5" name="Picture 4">
+            <a:extLst>
+              <a:ext uri="{FF2B5EF4-FFF2-40B4-BE49-F238E27FC236}">
+                <a16:creationId xmlns:a16="http://schemas.microsoft.com/office/drawing/2014/main" id="{CB2D1FCA-2563-4697-84B6-2E5B579D69BF}"/>
+              </a:ext>
+            </a:extLst>
+          </p:cNvPr>
+          <p:cNvPicPr>
+            <a:picLocks noChangeAspect="1"/>
+          </p:cNvPicPr>
+          <p:nvPr/>
+        </p:nvPicPr>
+        <p:blipFill>
+          <a:blip r:embed="rId2">
+            <a:extLst>
+              <a:ext uri="{28A0092B-C50C-407E-A947-70E740481C1C}">
+                <a14:useLocalDpi xmlns:a14="http://schemas.microsoft.com/office/drawing/2010/main" val="0"/>
+              </a:ext>
+            </a:extLst>
+          </a:blip>
+          <a:stretch>
+            <a:fillRect/>
+          </a:stretch>
+        </p:blipFill>
+        <p:spPr>
+          <a:xfrm>
+            <a:off x="5601810" y="1373484"/>
+            <a:ext cx="6293528" cy="5053459"/>
+          </a:xfrm>
+          <a:prstGeom prst="rect">
+            <a:avLst/>
+          </a:prstGeom>
+        </p:spPr>
+      </p:pic>
+      <p:sp>
+        <p:nvSpPr>
+          <p:cNvPr id="6" name="TextBox 5">
+            <a:extLst>
+              <a:ext uri="{FF2B5EF4-FFF2-40B4-BE49-F238E27FC236}">
+                <a16:creationId xmlns:a16="http://schemas.microsoft.com/office/drawing/2014/main" id="{AFDF5327-D5AE-479B-9B34-A5B2EC840E66}"/>
+              </a:ext>
+            </a:extLst>
+          </p:cNvPr>
+          <p:cNvSpPr txBox="1"/>
+          <p:nvPr/>
+        </p:nvSpPr>
+        <p:spPr>
+          <a:xfrm>
+            <a:off x="8048815" y="6492875"/>
+            <a:ext cx="4143185" cy="369332"/>
+          </a:xfrm>
+          <a:prstGeom prst="rect">
+            <a:avLst/>
+          </a:prstGeom>
+          <a:noFill/>
+        </p:spPr>
+        <p:txBody>
+          <a:bodyPr wrap="none" rtlCol="0">
+            <a:spAutoFit/>
+          </a:bodyPr>
+          <a:lstStyle/>
+          <a:p>
+            <a:r>
+              <a:rPr lang="en-GB" dirty="0"/>
+              <a:t>https://zhuanlan.zhihu.com/p/361449814</a:t>
+            </a:r>
+          </a:p>
+        </p:txBody>
+      </p:sp>
+    </p:spTree>
+    <p:extLst>
+      <p:ext uri="{BB962C8B-B14F-4D97-AF65-F5344CB8AC3E}">
+        <p14:creationId xmlns:p14="http://schemas.microsoft.com/office/powerpoint/2010/main" val="2633364411"/>
+      </p:ext>
+    </p:extLst>
+  </p:cSld>
+  <p:clrMapOvr>
+    <a:masterClrMapping/>
+  </p:clrMapOvr>
+</p:sld>
+</file>
+
+<file path=ppt/slides/slide4.xml><?xml version="1.0" encoding="utf-8"?>
+<p:sld xmlns:a="http://schemas.openxmlformats.org/drawingml/2006/main" xmlns:r="http://schemas.openxmlformats.org/officeDocument/2006/relationships" xmlns:p="http://schemas.openxmlformats.org/presentationml/2006/main">
+  <p:cSld>
+    <p:spTree>
+      <p:nvGrpSpPr>
+        <p:cNvPr id="1" name=""/>
+        <p:cNvGrpSpPr/>
+        <p:nvPr/>
+      </p:nvGrpSpPr>
+      <p:grpSpPr>
+        <a:xfrm>
+          <a:off x="0" y="0"/>
+          <a:ext cx="0" cy="0"/>
+          <a:chOff x="0" y="0"/>
+          <a:chExt cx="0" cy="0"/>
+        </a:xfrm>
+      </p:grpSpPr>
+      <p:sp>
+        <p:nvSpPr>
+          <p:cNvPr id="2" name="Title 1">
+            <a:extLst>
+              <a:ext uri="{FF2B5EF4-FFF2-40B4-BE49-F238E27FC236}">
+                <a16:creationId xmlns:a16="http://schemas.microsoft.com/office/drawing/2014/main" id="{F9B15984-8BC1-435A-8AC3-C1CFD3706EB4}"/>
+              </a:ext>
+            </a:extLst>
+          </p:cNvPr>
+          <p:cNvSpPr>
+            <a:spLocks noGrp="1"/>
+          </p:cNvSpPr>
+          <p:nvPr>
+            <p:ph type="ctrTitle"/>
+          </p:nvPr>
+        </p:nvSpPr>
+        <p:spPr>
+          <a:xfrm>
+            <a:off x="1524000" y="2235200"/>
+            <a:ext cx="9144000" cy="2387600"/>
+          </a:xfrm>
+        </p:spPr>
+        <p:txBody>
+          <a:bodyPr anchor="ctr"/>
+          <a:lstStyle/>
+          <a:p>
+            <a:r>
+              <a:rPr lang="en-GB" dirty="0"/>
+              <a:t>When are LM and GLM the same?</a:t>
+            </a:r>
+          </a:p>
+        </p:txBody>
+      </p:sp>
+    </p:spTree>
+    <p:extLst>
+      <p:ext uri="{BB962C8B-B14F-4D97-AF65-F5344CB8AC3E}">
+        <p14:creationId xmlns:p14="http://schemas.microsoft.com/office/powerpoint/2010/main" val="2264685100"/>
+      </p:ext>
+    </p:extLst>
+  </p:cSld>
+  <p:clrMapOvr>
+    <a:masterClrMapping/>
+  </p:clrMapOvr>
+</p:sld>
+</file>
+
+<file path=ppt/slides/slide5.xml><?xml version="1.0" encoding="utf-8"?>
+<p:sld xmlns:a="http://schemas.openxmlformats.org/drawingml/2006/main" xmlns:r="http://schemas.openxmlformats.org/officeDocument/2006/relationships" xmlns:p="http://schemas.openxmlformats.org/presentationml/2006/main">
+  <p:cSld>
+    <p:spTree>
+      <p:nvGrpSpPr>
+        <p:cNvPr id="1" name=""/>
+        <p:cNvGrpSpPr/>
+        <p:nvPr/>
+      </p:nvGrpSpPr>
+      <p:grpSpPr>
+        <a:xfrm>
+          <a:off x="0" y="0"/>
+          <a:ext cx="0" cy="0"/>
+          <a:chOff x="0" y="0"/>
+          <a:chExt cx="0" cy="0"/>
+        </a:xfrm>
+      </p:grpSpPr>
+      <p:sp>
+        <p:nvSpPr>
+          <p:cNvPr id="4" name="Title 3">
+            <a:extLst>
+              <a:ext uri="{FF2B5EF4-FFF2-40B4-BE49-F238E27FC236}">
+                <a16:creationId xmlns:a16="http://schemas.microsoft.com/office/drawing/2014/main" id="{EE9A9FE2-05A3-475D-A033-5ABFE9BC1573}"/>
+              </a:ext>
+            </a:extLst>
+          </p:cNvPr>
+          <p:cNvSpPr>
+            <a:spLocks noGrp="1"/>
+          </p:cNvSpPr>
+          <p:nvPr>
+            <p:ph type="title"/>
+          </p:nvPr>
+        </p:nvSpPr>
+        <p:spPr/>
+        <p:txBody>
+          <a:bodyPr/>
+          <a:lstStyle/>
+          <a:p>
+            <a:pPr algn="ctr"/>
+            <a:r>
+              <a:rPr lang="en-GB" dirty="0"/>
+              <a:t>Fixed effects vs. Random effects</a:t>
+            </a:r>
+          </a:p>
+        </p:txBody>
+      </p:sp>
+      <p:sp>
+        <p:nvSpPr>
+          <p:cNvPr id="5" name="Text Placeholder 4">
+            <a:extLst>
+              <a:ext uri="{FF2B5EF4-FFF2-40B4-BE49-F238E27FC236}">
+                <a16:creationId xmlns:a16="http://schemas.microsoft.com/office/drawing/2014/main" id="{BCD78042-27B3-4DF7-94EC-F8EB66DEFFA0}"/>
+              </a:ext>
+            </a:extLst>
+          </p:cNvPr>
+          <p:cNvSpPr>
+            <a:spLocks noGrp="1"/>
+          </p:cNvSpPr>
+          <p:nvPr>
+            <p:ph type="body" idx="1"/>
+          </p:nvPr>
+        </p:nvSpPr>
+        <p:spPr/>
+        <p:txBody>
+          <a:bodyPr/>
+          <a:lstStyle/>
+          <a:p>
+            <a:r>
+              <a:rPr lang="en-GB" dirty="0"/>
+              <a:t>Fixed effects</a:t>
+            </a:r>
+          </a:p>
+        </p:txBody>
+      </p:sp>
+      <p:sp>
+        <p:nvSpPr>
+          <p:cNvPr id="6" name="Content Placeholder 5">
+            <a:extLst>
+              <a:ext uri="{FF2B5EF4-FFF2-40B4-BE49-F238E27FC236}">
+                <a16:creationId xmlns:a16="http://schemas.microsoft.com/office/drawing/2014/main" id="{B5A82069-AC9F-485F-A042-239136D36DCB}"/>
+              </a:ext>
+            </a:extLst>
+          </p:cNvPr>
+          <p:cNvSpPr>
+            <a:spLocks noGrp="1"/>
+          </p:cNvSpPr>
+          <p:nvPr>
+            <p:ph sz="half" idx="2"/>
+          </p:nvPr>
+        </p:nvSpPr>
+        <p:spPr/>
+        <p:txBody>
+          <a:bodyPr>
+            <a:normAutofit lnSpcReduction="10000"/>
+          </a:bodyPr>
+          <a:lstStyle/>
+          <a:p>
+            <a:r>
+              <a:rPr lang="en-GB" dirty="0"/>
+              <a:t>Change they cause to individual is constant:</a:t>
+            </a:r>
+          </a:p>
+          <a:p>
+            <a:pPr marL="0" indent="0">
+              <a:buNone/>
+            </a:pPr>
+            <a:r>
+              <a:rPr lang="en-GB" dirty="0"/>
+              <a:t>Population – Treatment</a:t>
+            </a:r>
+          </a:p>
+          <a:p>
+            <a:pPr marL="0" indent="0">
+              <a:buNone/>
+            </a:pPr>
+            <a:endParaRPr lang="en-GB" dirty="0"/>
+          </a:p>
+          <a:p>
+            <a:r>
+              <a:rPr lang="en-GB" dirty="0"/>
+              <a:t>Variable of interest for researcher</a:t>
+            </a:r>
+          </a:p>
+          <a:p>
+            <a:endParaRPr lang="en-GB" dirty="0"/>
+          </a:p>
+          <a:p>
+            <a:r>
+              <a:rPr lang="en-GB" dirty="0"/>
+              <a:t>Estimated with full memory loss</a:t>
+            </a:r>
+          </a:p>
+        </p:txBody>
+      </p:sp>
+      <p:sp>
+        <p:nvSpPr>
+          <p:cNvPr id="7" name="Text Placeholder 6">
+            <a:extLst>
+              <a:ext uri="{FF2B5EF4-FFF2-40B4-BE49-F238E27FC236}">
+                <a16:creationId xmlns:a16="http://schemas.microsoft.com/office/drawing/2014/main" id="{E4B10CAE-D255-46C0-9591-77E0B5A2D544}"/>
+              </a:ext>
+            </a:extLst>
+          </p:cNvPr>
+          <p:cNvSpPr>
+            <a:spLocks noGrp="1"/>
+          </p:cNvSpPr>
+          <p:nvPr>
+            <p:ph type="body" sz="quarter" idx="3"/>
+          </p:nvPr>
+        </p:nvSpPr>
+        <p:spPr/>
+        <p:txBody>
+          <a:bodyPr/>
+          <a:lstStyle/>
+          <a:p>
+            <a:r>
+              <a:rPr lang="en-GB" dirty="0"/>
+              <a:t>Random effects</a:t>
+            </a:r>
+          </a:p>
+        </p:txBody>
+      </p:sp>
+      <p:sp>
+        <p:nvSpPr>
+          <p:cNvPr id="8" name="Content Placeholder 7">
+            <a:extLst>
+              <a:ext uri="{FF2B5EF4-FFF2-40B4-BE49-F238E27FC236}">
+                <a16:creationId xmlns:a16="http://schemas.microsoft.com/office/drawing/2014/main" id="{76AFAC07-D536-49B2-A663-E8D42A9751E7}"/>
+              </a:ext>
+            </a:extLst>
+          </p:cNvPr>
+          <p:cNvSpPr>
+            <a:spLocks noGrp="1"/>
+          </p:cNvSpPr>
+          <p:nvPr>
+            <p:ph sz="quarter" idx="4"/>
+          </p:nvPr>
+        </p:nvSpPr>
+        <p:spPr/>
+        <p:txBody>
+          <a:bodyPr>
+            <a:normAutofit lnSpcReduction="10000"/>
+          </a:bodyPr>
+          <a:lstStyle/>
+          <a:p>
+            <a:r>
+              <a:rPr lang="en-GB" dirty="0"/>
+              <a:t>Varies across individual</a:t>
+            </a:r>
+            <a:br>
+              <a:rPr lang="en-GB" dirty="0"/>
+            </a:br>
+            <a:endParaRPr lang="en-GB" dirty="0"/>
+          </a:p>
+          <a:p>
+            <a:pPr marL="0" indent="0">
+              <a:buNone/>
+            </a:pPr>
+            <a:r>
+              <a:rPr lang="en-GB" dirty="0"/>
+              <a:t>Year - individual</a:t>
+            </a:r>
+          </a:p>
+          <a:p>
+            <a:pPr marL="0" indent="0">
+              <a:buNone/>
+            </a:pPr>
+            <a:endParaRPr lang="en-GB" dirty="0"/>
+          </a:p>
+          <a:p>
+            <a:r>
+              <a:rPr lang="en-GB" dirty="0"/>
+              <a:t>“Other” variable interesting for the population </a:t>
+            </a:r>
+          </a:p>
+          <a:p>
+            <a:endParaRPr lang="en-GB" dirty="0"/>
+          </a:p>
+          <a:p>
+            <a:r>
+              <a:rPr lang="en-GB" dirty="0"/>
+              <a:t>Estimated with partial pooling</a:t>
+            </a:r>
+          </a:p>
+          <a:p>
+            <a:pPr marL="0" indent="0">
+              <a:buNone/>
+            </a:pPr>
+            <a:endParaRPr lang="en-GB" dirty="0"/>
+          </a:p>
+        </p:txBody>
+      </p:sp>
+    </p:spTree>
+    <p:extLst>
+      <p:ext uri="{BB962C8B-B14F-4D97-AF65-F5344CB8AC3E}">
+        <p14:creationId xmlns:p14="http://schemas.microsoft.com/office/powerpoint/2010/main" val="377524852"/>
+      </p:ext>
+    </p:extLst>
+  </p:cSld>
+  <p:clrMapOvr>
+    <a:masterClrMapping/>
+  </p:clrMapOvr>
+</p:sld>
+</file>
+
+<file path=ppt/slides/slide6.xml><?xml version="1.0" encoding="utf-8"?>
+<p:sld xmlns:a="http://schemas.openxmlformats.org/drawingml/2006/main" xmlns:r="http://schemas.openxmlformats.org/officeDocument/2006/relationships" xmlns:p="http://schemas.openxmlformats.org/presentationml/2006/main">
+  <p:cSld>
+    <p:spTree>
+      <p:nvGrpSpPr>
+        <p:cNvPr id="1" name=""/>
+        <p:cNvGrpSpPr/>
+        <p:nvPr/>
+      </p:nvGrpSpPr>
+      <p:grpSpPr>
+        <a:xfrm>
+          <a:off x="0" y="0"/>
+          <a:ext cx="0" cy="0"/>
+          <a:chOff x="0" y="0"/>
+          <a:chExt cx="0" cy="0"/>
+        </a:xfrm>
+      </p:grpSpPr>
+      <p:pic>
+        <p:nvPicPr>
+          <p:cNvPr id="10" name="Content Placeholder 9">
+            <a:extLst>
+              <a:ext uri="{FF2B5EF4-FFF2-40B4-BE49-F238E27FC236}">
+                <a16:creationId xmlns:a16="http://schemas.microsoft.com/office/drawing/2014/main" id="{D4D6EC67-655E-424E-BABD-036A24A1697A}"/>
+              </a:ext>
+            </a:extLst>
+          </p:cNvPr>
+          <p:cNvPicPr>
+            <a:picLocks noGrp="1" noChangeAspect="1"/>
+          </p:cNvPicPr>
+          <p:nvPr>
+            <p:ph idx="1"/>
+          </p:nvPr>
+        </p:nvPicPr>
+        <p:blipFill>
+          <a:blip r:embed="rId2">
+            <a:extLst>
+              <a:ext uri="{28A0092B-C50C-407E-A947-70E740481C1C}">
+                <a14:useLocalDpi xmlns:a14="http://schemas.microsoft.com/office/drawing/2010/main" val="0"/>
+              </a:ext>
+            </a:extLst>
+          </a:blip>
+          <a:stretch>
+            <a:fillRect/>
+          </a:stretch>
+        </p:blipFill>
+        <p:spPr>
+          <a:xfrm>
+            <a:off x="1928505" y="482451"/>
+            <a:ext cx="8334989" cy="5893098"/>
+          </a:xfrm>
+        </p:spPr>
+      </p:pic>
+      <p:sp>
+        <p:nvSpPr>
+          <p:cNvPr id="11" name="TextBox 10">
+            <a:extLst>
+              <a:ext uri="{FF2B5EF4-FFF2-40B4-BE49-F238E27FC236}">
+                <a16:creationId xmlns:a16="http://schemas.microsoft.com/office/drawing/2014/main" id="{58B8C341-C5B1-44D9-922D-878A7DC2EC79}"/>
+              </a:ext>
+            </a:extLst>
+          </p:cNvPr>
+          <p:cNvSpPr txBox="1"/>
+          <p:nvPr/>
+        </p:nvSpPr>
+        <p:spPr>
+          <a:xfrm>
+            <a:off x="6409678" y="6488668"/>
+            <a:ext cx="6578354" cy="369332"/>
+          </a:xfrm>
+          <a:prstGeom prst="rect">
+            <a:avLst/>
+          </a:prstGeom>
+          <a:noFill/>
+        </p:spPr>
+        <p:txBody>
+          <a:bodyPr wrap="square" rtlCol="0">
+            <a:spAutoFit/>
+          </a:bodyPr>
+          <a:lstStyle/>
+          <a:p>
+            <a:r>
+              <a:rPr lang="en-GB" dirty="0"/>
+              <a:t>https://conductrics.com/prediction-pooling-and-shrinkage/</a:t>
+            </a:r>
+          </a:p>
+        </p:txBody>
+      </p:sp>
+    </p:spTree>
+    <p:extLst>
+      <p:ext uri="{BB962C8B-B14F-4D97-AF65-F5344CB8AC3E}">
+        <p14:creationId xmlns:p14="http://schemas.microsoft.com/office/powerpoint/2010/main" val="565337253"/>
+      </p:ext>
+    </p:extLst>
+  </p:cSld>
+  <p:clrMapOvr>
+    <a:masterClrMapping/>
+  </p:clrMapOvr>
+</p:sld>
+</file>
+
+<file path=ppt/slides/slide7.xml><?xml version="1.0" encoding="utf-8"?>
+<p:sld xmlns:a="http://schemas.openxmlformats.org/drawingml/2006/main" xmlns:r="http://schemas.openxmlformats.org/officeDocument/2006/relationships" xmlns:p="http://schemas.openxmlformats.org/presentationml/2006/main">
+  <p:cSld>
+    <p:spTree>
+      <p:nvGrpSpPr>
+        <p:cNvPr id="1" name=""/>
+        <p:cNvGrpSpPr/>
+        <p:nvPr/>
+      </p:nvGrpSpPr>
+      <p:grpSpPr>
+        <a:xfrm>
+          <a:off x="0" y="0"/>
+          <a:ext cx="0" cy="0"/>
+          <a:chOff x="0" y="0"/>
+          <a:chExt cx="0" cy="0"/>
+        </a:xfrm>
+      </p:grpSpPr>
+      <p:sp>
+        <p:nvSpPr>
+          <p:cNvPr id="2" name="Title 1">
+            <a:extLst>
+              <a:ext uri="{FF2B5EF4-FFF2-40B4-BE49-F238E27FC236}">
+                <a16:creationId xmlns:a16="http://schemas.microsoft.com/office/drawing/2014/main" id="{9BDD9FD7-2F16-43B1-8A40-8D13C355BF02}"/>
+              </a:ext>
+            </a:extLst>
+          </p:cNvPr>
+          <p:cNvSpPr>
+            <a:spLocks noGrp="1"/>
+          </p:cNvSpPr>
+          <p:nvPr>
+            <p:ph type="title"/>
+          </p:nvPr>
+        </p:nvSpPr>
+        <p:spPr/>
+        <p:txBody>
+          <a:bodyPr/>
+          <a:lstStyle/>
+          <a:p>
+            <a:r>
+              <a:rPr lang="en-GB" dirty="0"/>
+              <a:t>Examples from R</a:t>
+            </a:r>
+          </a:p>
+        </p:txBody>
+      </p:sp>
+      <p:pic>
+        <p:nvPicPr>
+          <p:cNvPr id="5" name="Content Placeholder 4">
+            <a:extLst>
+              <a:ext uri="{FF2B5EF4-FFF2-40B4-BE49-F238E27FC236}">
+                <a16:creationId xmlns:a16="http://schemas.microsoft.com/office/drawing/2014/main" id="{E1157AF2-6450-4EF2-8845-A288B6D31459}"/>
+              </a:ext>
+            </a:extLst>
+          </p:cNvPr>
+          <p:cNvPicPr>
+            <a:picLocks noGrp="1" noChangeAspect="1"/>
+          </p:cNvPicPr>
+          <p:nvPr>
+            <p:ph idx="1"/>
+          </p:nvPr>
+        </p:nvPicPr>
+        <p:blipFill>
+          <a:blip r:embed="rId2">
+            <a:extLst>
+              <a:ext uri="{28A0092B-C50C-407E-A947-70E740481C1C}">
+                <a14:useLocalDpi xmlns:a14="http://schemas.microsoft.com/office/drawing/2010/main" val="0"/>
+              </a:ext>
+            </a:extLst>
+          </a:blip>
+          <a:stretch>
+            <a:fillRect/>
+          </a:stretch>
+        </p:blipFill>
+        <p:spPr>
+          <a:xfrm>
+            <a:off x="6186205" y="2646872"/>
+            <a:ext cx="5067301" cy="3619500"/>
+          </a:xfrm>
+        </p:spPr>
+      </p:pic>
+      <p:pic>
+        <p:nvPicPr>
+          <p:cNvPr id="7" name="Picture 6">
+            <a:extLst>
+              <a:ext uri="{FF2B5EF4-FFF2-40B4-BE49-F238E27FC236}">
+                <a16:creationId xmlns:a16="http://schemas.microsoft.com/office/drawing/2014/main" id="{02EAA0C3-2579-46DE-A44F-5902EAB25645}"/>
+              </a:ext>
+            </a:extLst>
+          </p:cNvPr>
+          <p:cNvPicPr>
+            <a:picLocks noChangeAspect="1"/>
+          </p:cNvPicPr>
+          <p:nvPr/>
+        </p:nvPicPr>
+        <p:blipFill>
+          <a:blip r:embed="rId3">
+            <a:extLst>
+              <a:ext uri="{28A0092B-C50C-407E-A947-70E740481C1C}">
+                <a14:useLocalDpi xmlns:a14="http://schemas.microsoft.com/office/drawing/2010/main" val="0"/>
+              </a:ext>
+            </a:extLst>
+          </a:blip>
+          <a:stretch>
+            <a:fillRect/>
+          </a:stretch>
+        </p:blipFill>
+        <p:spPr>
+          <a:xfrm>
+            <a:off x="762326" y="2646872"/>
+            <a:ext cx="5067301" cy="3619500"/>
+          </a:xfrm>
+          <a:prstGeom prst="rect">
+            <a:avLst/>
+          </a:prstGeom>
+        </p:spPr>
+      </p:pic>
+      <p:sp>
+        <p:nvSpPr>
+          <p:cNvPr id="8" name="TextBox 7">
+            <a:extLst>
+              <a:ext uri="{FF2B5EF4-FFF2-40B4-BE49-F238E27FC236}">
+                <a16:creationId xmlns:a16="http://schemas.microsoft.com/office/drawing/2014/main" id="{3477642D-5EB2-4C31-AD6E-D617A401B775}"/>
+              </a:ext>
+            </a:extLst>
+          </p:cNvPr>
+          <p:cNvSpPr txBox="1"/>
+          <p:nvPr/>
+        </p:nvSpPr>
+        <p:spPr>
+          <a:xfrm>
+            <a:off x="134225" y="6488668"/>
+            <a:ext cx="3583289" cy="276999"/>
+          </a:xfrm>
+          <a:prstGeom prst="rect">
+            <a:avLst/>
+          </a:prstGeom>
+          <a:noFill/>
+        </p:spPr>
+        <p:txBody>
+          <a:bodyPr wrap="none" rtlCol="0">
+            <a:spAutoFit/>
+          </a:bodyPr>
+          <a:lstStyle/>
+          <a:p>
+            <a:r>
+              <a:rPr lang="en-GB" sz="1200" dirty="0"/>
+              <a:t>https://aosmith.rbind.io/2018/11/16/plot-fitted-lines/</a:t>
+            </a:r>
+          </a:p>
+        </p:txBody>
+      </p:sp>
+      <p:pic>
+        <p:nvPicPr>
+          <p:cNvPr id="9" name="Picture 8">
+            <a:extLst>
+              <a:ext uri="{FF2B5EF4-FFF2-40B4-BE49-F238E27FC236}">
+                <a16:creationId xmlns:a16="http://schemas.microsoft.com/office/drawing/2014/main" id="{E25FE2C0-C683-49C7-80D6-1C018FFC7202}"/>
+              </a:ext>
+            </a:extLst>
+          </p:cNvPr>
+          <p:cNvPicPr>
+            <a:picLocks noChangeAspect="1"/>
+          </p:cNvPicPr>
+          <p:nvPr/>
+        </p:nvPicPr>
+        <p:blipFill>
+          <a:blip r:embed="rId4"/>
+          <a:stretch>
+            <a:fillRect/>
+          </a:stretch>
+        </p:blipFill>
+        <p:spPr>
+          <a:xfrm>
+            <a:off x="1128684" y="1725805"/>
+            <a:ext cx="4163006" cy="885949"/>
+          </a:xfrm>
+          <a:prstGeom prst="rect">
+            <a:avLst/>
+          </a:prstGeom>
+        </p:spPr>
+      </p:pic>
+      <p:pic>
+        <p:nvPicPr>
+          <p:cNvPr id="10" name="Picture 9">
+            <a:extLst>
+              <a:ext uri="{FF2B5EF4-FFF2-40B4-BE49-F238E27FC236}">
+                <a16:creationId xmlns:a16="http://schemas.microsoft.com/office/drawing/2014/main" id="{98BFA4FF-3F8D-410A-872D-6C44AA890582}"/>
+              </a:ext>
+            </a:extLst>
+          </p:cNvPr>
+          <p:cNvPicPr>
+            <a:picLocks noChangeAspect="1"/>
+          </p:cNvPicPr>
+          <p:nvPr/>
+        </p:nvPicPr>
+        <p:blipFill rotWithShape="1">
+          <a:blip r:embed="rId4"/>
+          <a:srcRect r="69715"/>
+          <a:stretch/>
+        </p:blipFill>
+        <p:spPr>
+          <a:xfrm>
+            <a:off x="6557759" y="1682457"/>
+            <a:ext cx="1260780" cy="885949"/>
+          </a:xfrm>
+          <a:prstGeom prst="rect">
+            <a:avLst/>
+          </a:prstGeom>
+        </p:spPr>
+      </p:pic>
+      <p:pic>
+        <p:nvPicPr>
+          <p:cNvPr id="11" name="Picture 10">
+            <a:extLst>
+              <a:ext uri="{FF2B5EF4-FFF2-40B4-BE49-F238E27FC236}">
+                <a16:creationId xmlns:a16="http://schemas.microsoft.com/office/drawing/2014/main" id="{1A98BBD0-B874-4DF1-B61D-7357F407CDF6}"/>
+              </a:ext>
+            </a:extLst>
+          </p:cNvPr>
+          <p:cNvPicPr>
+            <a:picLocks noChangeAspect="1"/>
+          </p:cNvPicPr>
+          <p:nvPr/>
+        </p:nvPicPr>
+        <p:blipFill rotWithShape="1">
+          <a:blip r:embed="rId4"/>
+          <a:srcRect l="47615" r="1"/>
+          <a:stretch/>
+        </p:blipFill>
+        <p:spPr>
+          <a:xfrm>
+            <a:off x="7818539" y="1690688"/>
+            <a:ext cx="2180772" cy="885949"/>
+          </a:xfrm>
+          <a:prstGeom prst="rect">
+            <a:avLst/>
+          </a:prstGeom>
+        </p:spPr>
+      </p:pic>
+    </p:spTree>
+    <p:extLst>
+      <p:ext uri="{BB962C8B-B14F-4D97-AF65-F5344CB8AC3E}">
+        <p14:creationId xmlns:p14="http://schemas.microsoft.com/office/powerpoint/2010/main" val="3256679153"/>
+      </p:ext>
+    </p:extLst>
+  </p:cSld>
+  <p:clrMapOvr>
+    <a:masterClrMapping/>
+  </p:clrMapOvr>
+</p:sld>
+</file>
+
+<file path=ppt/slides/slide8.xml><?xml version="1.0" encoding="utf-8"?>
+<p:sld xmlns:a="http://schemas.openxmlformats.org/drawingml/2006/main" xmlns:r="http://schemas.openxmlformats.org/officeDocument/2006/relationships" xmlns:p="http://schemas.openxmlformats.org/presentationml/2006/main">
+  <p:cSld>
+    <p:bg>
+      <p:bgPr>
+        <a:blipFill dpi="0" rotWithShape="1">
+          <a:blip r:embed="rId2">
+            <a:alphaModFix amt="72000"/>
+            <a:lum/>
+          </a:blip>
+          <a:srcRect/>
+          <a:stretch>
+            <a:fillRect t="-12000" b="-12000"/>
+          </a:stretch>
+        </a:blipFill>
+        <a:effectLst/>
+      </p:bgPr>
+    </p:bg>
+    <p:spTree>
+      <p:nvGrpSpPr>
+        <p:cNvPr id="1" name=""/>
+        <p:cNvGrpSpPr/>
+        <p:nvPr/>
+      </p:nvGrpSpPr>
+      <p:grpSpPr>
+        <a:xfrm>
+          <a:off x="0" y="0"/>
+          <a:ext cx="0" cy="0"/>
+          <a:chOff x="0" y="0"/>
+          <a:chExt cx="0" cy="0"/>
+        </a:xfrm>
+      </p:grpSpPr>
+      <p:sp>
+        <p:nvSpPr>
+          <p:cNvPr id="2" name="Title 1">
+            <a:extLst>
+              <a:ext uri="{FF2B5EF4-FFF2-40B4-BE49-F238E27FC236}">
+                <a16:creationId xmlns:a16="http://schemas.microsoft.com/office/drawing/2014/main" id="{4E9D77A6-51BA-4AFD-8FC0-057C46D4A64D}"/>
+              </a:ext>
+            </a:extLst>
+          </p:cNvPr>
+          <p:cNvSpPr>
+            <a:spLocks noGrp="1"/>
+          </p:cNvSpPr>
+          <p:nvPr>
+            <p:ph type="ctrTitle"/>
+          </p:nvPr>
+        </p:nvSpPr>
+        <p:spPr>
+          <a:xfrm rot="988642">
+            <a:off x="401882" y="1690746"/>
+            <a:ext cx="9144000" cy="1233725"/>
+          </a:xfrm>
+        </p:spPr>
+        <p:txBody>
+          <a:bodyPr/>
+          <a:lstStyle/>
+          <a:p>
+            <a:r>
+              <a:rPr lang="en-GB" b="1"/>
+              <a:t>Non-linear regressions</a:t>
+            </a:r>
+            <a:endParaRPr lang="en-GB" b="1" dirty="0"/>
+          </a:p>
+        </p:txBody>
+      </p:sp>
+    </p:spTree>
+    <p:extLst>
+      <p:ext uri="{BB962C8B-B14F-4D97-AF65-F5344CB8AC3E}">
+        <p14:creationId xmlns:p14="http://schemas.microsoft.com/office/powerpoint/2010/main" val="1166975239"/>
+      </p:ext>
+    </p:extLst>
+  </p:cSld>
+  <p:clrMapOvr>
+    <a:masterClrMapping/>
+  </p:clrMapOvr>
+</p:sld>
+</file>
+
+<file path=ppt/slides/slide9.xml><?xml version="1.0" encoding="utf-8"?>
+<p:sld xmlns:a="http://schemas.openxmlformats.org/drawingml/2006/main" xmlns:r="http://schemas.openxmlformats.org/officeDocument/2006/relationships" xmlns:p="http://schemas.openxmlformats.org/presentationml/2006/main">
+  <p:cSld>
+    <p:spTree>
+      <p:nvGrpSpPr>
+        <p:cNvPr id="1" name=""/>
+        <p:cNvGrpSpPr/>
+        <p:nvPr/>
+      </p:nvGrpSpPr>
+      <p:grpSpPr>
+        <a:xfrm>
+          <a:off x="0" y="0"/>
+          <a:ext cx="0" cy="0"/>
+          <a:chOff x="0" y="0"/>
+          <a:chExt cx="0" cy="0"/>
+        </a:xfrm>
+      </p:grpSpPr>
+      <p:sp>
+        <p:nvSpPr>
+          <p:cNvPr id="2" name="Title 1">
+            <a:extLst>
+              <a:ext uri="{FF2B5EF4-FFF2-40B4-BE49-F238E27FC236}">
+                <a16:creationId xmlns:a16="http://schemas.microsoft.com/office/drawing/2014/main" id="{3F5007A6-55EF-4B82-A19F-8E20F3F2EF4D}"/>
+              </a:ext>
+            </a:extLst>
+          </p:cNvPr>
+          <p:cNvSpPr>
+            <a:spLocks noGrp="1"/>
+          </p:cNvSpPr>
+          <p:nvPr>
+            <p:ph type="title"/>
+          </p:nvPr>
+        </p:nvSpPr>
+        <p:spPr/>
+        <p:txBody>
+          <a:bodyPr/>
+          <a:lstStyle/>
+          <a:p>
+            <a:r>
+              <a:rPr lang="en-GB" dirty="0"/>
+              <a:t>Adding climate drivers</a:t>
+            </a:r>
+          </a:p>
+        </p:txBody>
+      </p:sp>
+      <p:sp>
+        <p:nvSpPr>
+          <p:cNvPr id="3" name="Content Placeholder 2">
+            <a:extLst>
+              <a:ext uri="{FF2B5EF4-FFF2-40B4-BE49-F238E27FC236}">
+                <a16:creationId xmlns:a16="http://schemas.microsoft.com/office/drawing/2014/main" id="{4DB76920-20F8-4FFB-899A-2C05D0BAB9B1}"/>
+              </a:ext>
+            </a:extLst>
+          </p:cNvPr>
+          <p:cNvSpPr>
+            <a:spLocks noGrp="1"/>
+          </p:cNvSpPr>
+          <p:nvPr>
+            <p:ph idx="1"/>
+          </p:nvPr>
+        </p:nvSpPr>
+        <p:spPr/>
+        <p:txBody>
+          <a:bodyPr/>
+          <a:lstStyle/>
+          <a:p>
+            <a:r>
+              <a:rPr lang="en-GB" dirty="0"/>
+              <a:t>Fixed factors</a:t>
+            </a:r>
+          </a:p>
+          <a:p>
+            <a:endParaRPr lang="en-GB" dirty="0"/>
+          </a:p>
+          <a:p>
+            <a:r>
+              <a:rPr lang="en-GB" dirty="0"/>
+              <a:t>Interactions with other variables</a:t>
+            </a:r>
+          </a:p>
+          <a:p>
+            <a:pPr lvl="1"/>
+            <a:r>
+              <a:rPr lang="en-GB" dirty="0"/>
+              <a:t>Size</a:t>
+            </a:r>
+          </a:p>
+          <a:p>
+            <a:pPr lvl="1"/>
+            <a:r>
+              <a:rPr lang="en-GB" dirty="0"/>
+              <a:t>Populations</a:t>
+            </a:r>
+          </a:p>
+          <a:p>
+            <a:endParaRPr lang="en-GB" dirty="0"/>
+          </a:p>
+          <a:p>
+            <a:r>
+              <a:rPr lang="en-GB" dirty="0"/>
+              <a:t>How to pick climate driver candidates?</a:t>
+            </a:r>
+          </a:p>
+        </p:txBody>
+      </p:sp>
+    </p:spTree>
+    <p:extLst>
+      <p:ext uri="{BB962C8B-B14F-4D97-AF65-F5344CB8AC3E}">
+        <p14:creationId xmlns:p14="http://schemas.microsoft.com/office/powerpoint/2010/main" val="3384981871"/>
+      </p:ext>
+    </p:extLst>
+  </p:cSld>
+  <p:clrMapOvr>
+    <a:masterClrMapping/>
+  </p:clrMapOvr>
+</p:sld>
+</file>
+
 <file path=ppt/theme/theme1.xml><?xml version="1.0" encoding="utf-8"?>
 <a:theme xmlns:a="http://schemas.openxmlformats.org/drawingml/2006/main" name="Office Theme">
   <a:themeElements>

</xml_diff>